<commit_message>
ADDED FILES INTO REPORTS FOLDER
</commit_message>
<xml_diff>
--- a/reports/ppt/PROJECT_CHATBOT.pptx
+++ b/reports/ppt/PROJECT_CHATBOT.pptx
@@ -15,7 +15,9 @@
     <p:sldId id="265" r:id="rId9"/>
     <p:sldId id="263" r:id="rId10"/>
     <p:sldId id="266" r:id="rId11"/>
-    <p:sldId id="267" r:id="rId12"/>
+    <p:sldId id="268" r:id="rId12"/>
+    <p:sldId id="269" r:id="rId13"/>
+    <p:sldId id="267" r:id="rId14"/>
   </p:sldIdLst>
   <p:sldSz cx="12192000" cy="6858000"/>
   <p:notesSz cx="6858000" cy="9144000"/>
@@ -114,6 +116,11 @@
       </a:defRPr>
     </a:lvl9pPr>
   </p:defaultTextStyle>
+  <p:extLst>
+    <p:ext uri="{EFAFB233-063F-42B5-8137-9DF3F51BA10A}">
+      <p15:sldGuideLst xmlns:p15="http://schemas.microsoft.com/office/powerpoint/2012/main"/>
+    </p:ext>
+  </p:extLst>
 </p:presentation>
 </file>
 
@@ -2095,6 +2102,13 @@
         </dgm:presLayoutVars>
       </dgm:prSet>
       <dgm:spPr/>
+      <dgm:t>
+        <a:bodyPr/>
+        <a:lstStyle/>
+        <a:p>
+          <a:endParaRPr lang="en-IN"/>
+        </a:p>
+      </dgm:t>
     </dgm:pt>
     <dgm:pt modelId="{79DD81AC-EFD9-4DC0-B443-8B3710955663}" type="pres">
       <dgm:prSet presAssocID="{9767EADB-837F-4F78-8B62-0C489EEFD86F}" presName="compNode" presStyleCnt="0"/>
@@ -2104,7 +2118,7 @@
       <dgm:prSet presAssocID="{9767EADB-837F-4F78-8B62-0C489EEFD86F}" presName="iconRect" presStyleLbl="node1" presStyleIdx="0" presStyleCnt="3"/>
       <dgm:spPr>
         <a:blipFill>
-          <a:blip xmlns:r="http://schemas.openxmlformats.org/officeDocument/2006/relationships" r:embed="rId1">
+          <a:blip xmlns:r="http://schemas.openxmlformats.org/officeDocument/2006/relationships" r:embed="rId1" cstate="print">
             <a:extLst>
               <a:ext uri="{28A0092B-C50C-407E-A947-70E740481C1C}">
                 <a14:useLocalDpi xmlns:a14="http://schemas.microsoft.com/office/drawing/2010/main" val="0"/>
@@ -2120,6 +2134,13 @@
           <a:noFill/>
         </a:ln>
       </dgm:spPr>
+      <dgm:t>
+        <a:bodyPr/>
+        <a:lstStyle/>
+        <a:p>
+          <a:endParaRPr lang="en-IN"/>
+        </a:p>
+      </dgm:t>
     </dgm:pt>
     <dgm:pt modelId="{7AD5A369-D195-451E-B31A-C8A43358B753}" type="pres">
       <dgm:prSet presAssocID="{9767EADB-837F-4F78-8B62-0C489EEFD86F}" presName="spaceRect" presStyleCnt="0"/>
@@ -2133,6 +2154,13 @@
         </dgm:presLayoutVars>
       </dgm:prSet>
       <dgm:spPr/>
+      <dgm:t>
+        <a:bodyPr/>
+        <a:lstStyle/>
+        <a:p>
+          <a:endParaRPr lang="en-IN"/>
+        </a:p>
+      </dgm:t>
     </dgm:pt>
     <dgm:pt modelId="{5D89634C-B03E-4D16-ACB2-E56E6E8A2D0F}" type="pres">
       <dgm:prSet presAssocID="{0FFC8A3C-E7A4-4C94-9F42-6FA0401F1F60}" presName="sibTrans" presStyleCnt="0"/>
@@ -2146,7 +2174,7 @@
       <dgm:prSet presAssocID="{CEB22FEC-19C5-4A8F-ABA9-4A64A61D7A31}" presName="iconRect" presStyleLbl="node1" presStyleIdx="1" presStyleCnt="3"/>
       <dgm:spPr>
         <a:blipFill>
-          <a:blip xmlns:r="http://schemas.openxmlformats.org/officeDocument/2006/relationships" r:embed="rId2">
+          <a:blip xmlns:r="http://schemas.openxmlformats.org/officeDocument/2006/relationships" r:embed="rId2" cstate="print">
             <a:extLst>
               <a:ext uri="{28A0092B-C50C-407E-A947-70E740481C1C}">
                 <a14:useLocalDpi xmlns:a14="http://schemas.microsoft.com/office/drawing/2010/main" val="0"/>
@@ -2162,6 +2190,13 @@
           <a:noFill/>
         </a:ln>
       </dgm:spPr>
+      <dgm:t>
+        <a:bodyPr/>
+        <a:lstStyle/>
+        <a:p>
+          <a:endParaRPr lang="en-IN"/>
+        </a:p>
+      </dgm:t>
     </dgm:pt>
     <dgm:pt modelId="{2C744E2D-B3D8-4FCC-8B5B-911E61BDA57F}" type="pres">
       <dgm:prSet presAssocID="{CEB22FEC-19C5-4A8F-ABA9-4A64A61D7A31}" presName="spaceRect" presStyleCnt="0"/>
@@ -2175,6 +2210,13 @@
         </dgm:presLayoutVars>
       </dgm:prSet>
       <dgm:spPr/>
+      <dgm:t>
+        <a:bodyPr/>
+        <a:lstStyle/>
+        <a:p>
+          <a:endParaRPr lang="en-IN"/>
+        </a:p>
+      </dgm:t>
     </dgm:pt>
     <dgm:pt modelId="{C2C6A2CC-7497-4191-AD72-B9EAFA1BC78A}" type="pres">
       <dgm:prSet presAssocID="{2EE9919A-E6C5-4B9E-9D26-B96C845D8B8E}" presName="sibTrans" presStyleCnt="0"/>
@@ -2194,7 +2236,7 @@
                 <a14:useLocalDpi xmlns:a14="http://schemas.microsoft.com/office/drawing/2010/main" val="0"/>
               </a:ext>
               <a:ext uri="{96DAC541-7B7A-43D3-8B79-37D633B846F1}">
-                <asvg:svgBlip xmlns:asvg="http://schemas.microsoft.com/office/drawing/2016/SVG/main" r:embed="rId4"/>
+                <asvg:svgBlip xmlns:asvg="http://schemas.microsoft.com/office/drawing/2016/SVG/main" xmlns="" r:embed="rId4"/>
               </a:ext>
             </a:extLst>
           </a:blip>
@@ -2207,6 +2249,13 @@
           <a:noFill/>
         </a:ln>
       </dgm:spPr>
+      <dgm:t>
+        <a:bodyPr/>
+        <a:lstStyle/>
+        <a:p>
+          <a:endParaRPr lang="en-IN"/>
+        </a:p>
+      </dgm:t>
     </dgm:pt>
     <dgm:pt modelId="{EC5BF47A-EB40-4982-A98A-013995887350}" type="pres">
       <dgm:prSet presAssocID="{51A5417C-A833-41F1-874F-8CC3605C7E27}" presName="spaceRect" presStyleCnt="0"/>
@@ -2220,16 +2269,23 @@
         </dgm:presLayoutVars>
       </dgm:prSet>
       <dgm:spPr/>
+      <dgm:t>
+        <a:bodyPr/>
+        <a:lstStyle/>
+        <a:p>
+          <a:endParaRPr lang="en-IN"/>
+        </a:p>
+      </dgm:t>
     </dgm:pt>
   </dgm:ptLst>
   <dgm:cxnLst>
+    <dgm:cxn modelId="{538CEE19-C47B-4B3B-A961-C9C6CAB2A58F}" type="presOf" srcId="{CF8D6372-DE54-41F4-8421-28DBFF90EEE2}" destId="{CACBA383-F127-4FD0-A615-D91A8975F33E}" srcOrd="0" destOrd="0" presId="urn:microsoft.com/office/officeart/2018/2/layout/IconLabelList"/>
+    <dgm:cxn modelId="{696EB049-FDC0-462D-91DB-BB1E423B5F51}" srcId="{CF8D6372-DE54-41F4-8421-28DBFF90EEE2}" destId="{51A5417C-A833-41F1-874F-8CC3605C7E27}" srcOrd="2" destOrd="0" parTransId="{D3E13D9D-9B3E-40D8-A208-C27CDCC3AFD8}" sibTransId="{42EFA9CB-0296-4125-B919-A0364E38EF50}"/>
     <dgm:cxn modelId="{2D552618-6E95-41A7-BCDE-A960B0079198}" type="presOf" srcId="{CEB22FEC-19C5-4A8F-ABA9-4A64A61D7A31}" destId="{383D36FA-A4B0-4971-A663-A00480C14A3B}" srcOrd="0" destOrd="0" presId="urn:microsoft.com/office/officeart/2018/2/layout/IconLabelList"/>
-    <dgm:cxn modelId="{538CEE19-C47B-4B3B-A961-C9C6CAB2A58F}" type="presOf" srcId="{CF8D6372-DE54-41F4-8421-28DBFF90EEE2}" destId="{CACBA383-F127-4FD0-A615-D91A8975F33E}" srcOrd="0" destOrd="0" presId="urn:microsoft.com/office/officeart/2018/2/layout/IconLabelList"/>
+    <dgm:cxn modelId="{2A69C0EB-5C74-440C-B21D-BCD932BD3697}" srcId="{CF8D6372-DE54-41F4-8421-28DBFF90EEE2}" destId="{CEB22FEC-19C5-4A8F-ABA9-4A64A61D7A31}" srcOrd="1" destOrd="0" parTransId="{F8CD1E11-7A14-4289-A8A3-CFB5CC4EB7D0}" sibTransId="{2EE9919A-E6C5-4B9E-9D26-B96C845D8B8E}"/>
     <dgm:cxn modelId="{703A2A5F-7155-4263-8D92-5BE089ECA91F}" type="presOf" srcId="{51A5417C-A833-41F1-874F-8CC3605C7E27}" destId="{95B01B50-1ABC-491F-962F-B524E411323D}" srcOrd="0" destOrd="0" presId="urn:microsoft.com/office/officeart/2018/2/layout/IconLabelList"/>
-    <dgm:cxn modelId="{696EB049-FDC0-462D-91DB-BB1E423B5F51}" srcId="{CF8D6372-DE54-41F4-8421-28DBFF90EEE2}" destId="{51A5417C-A833-41F1-874F-8CC3605C7E27}" srcOrd="2" destOrd="0" parTransId="{D3E13D9D-9B3E-40D8-A208-C27CDCC3AFD8}" sibTransId="{42EFA9CB-0296-4125-B919-A0364E38EF50}"/>
+    <dgm:cxn modelId="{5552E84D-7BBD-46E3-95F8-6315D947EB6E}" type="presOf" srcId="{9767EADB-837F-4F78-8B62-0C489EEFD86F}" destId="{1193774E-24BC-4D8A-8FAD-BAA571E2AEE6}" srcOrd="0" destOrd="0" presId="urn:microsoft.com/office/officeart/2018/2/layout/IconLabelList"/>
     <dgm:cxn modelId="{BD55A34D-5E8E-40AF-A10A-66517A025D97}" srcId="{CF8D6372-DE54-41F4-8421-28DBFF90EEE2}" destId="{9767EADB-837F-4F78-8B62-0C489EEFD86F}" srcOrd="0" destOrd="0" parTransId="{FBEC5F14-0E67-46EC-9651-422AC6BA56CA}" sibTransId="{0FFC8A3C-E7A4-4C94-9F42-6FA0401F1F60}"/>
-    <dgm:cxn modelId="{5552E84D-7BBD-46E3-95F8-6315D947EB6E}" type="presOf" srcId="{9767EADB-837F-4F78-8B62-0C489EEFD86F}" destId="{1193774E-24BC-4D8A-8FAD-BAA571E2AEE6}" srcOrd="0" destOrd="0" presId="urn:microsoft.com/office/officeart/2018/2/layout/IconLabelList"/>
-    <dgm:cxn modelId="{2A69C0EB-5C74-440C-B21D-BCD932BD3697}" srcId="{CF8D6372-DE54-41F4-8421-28DBFF90EEE2}" destId="{CEB22FEC-19C5-4A8F-ABA9-4A64A61D7A31}" srcOrd="1" destOrd="0" parTransId="{F8CD1E11-7A14-4289-A8A3-CFB5CC4EB7D0}" sibTransId="{2EE9919A-E6C5-4B9E-9D26-B96C845D8B8E}"/>
     <dgm:cxn modelId="{7A492CCA-2EDD-46C9-8756-41DBB49C34C4}" type="presParOf" srcId="{CACBA383-F127-4FD0-A615-D91A8975F33E}" destId="{79DD81AC-EFD9-4DC0-B443-8B3710955663}" srcOrd="0" destOrd="0" presId="urn:microsoft.com/office/officeart/2018/2/layout/IconLabelList"/>
     <dgm:cxn modelId="{7B848246-1DEF-49FD-9671-3D4877579A6A}" type="presParOf" srcId="{79DD81AC-EFD9-4DC0-B443-8B3710955663}" destId="{ADA6EB37-5FB9-46EF-B757-5D575EE09C05}" srcOrd="0" destOrd="0" presId="urn:microsoft.com/office/officeart/2018/2/layout/IconLabelList"/>
     <dgm:cxn modelId="{C771E8F5-E454-418E-A48A-2719D0CA899B}" type="presParOf" srcId="{79DD81AC-EFD9-4DC0-B443-8B3710955663}" destId="{7AD5A369-D195-451E-B31A-C8A43358B753}" srcOrd="1" destOrd="0" presId="urn:microsoft.com/office/officeart/2018/2/layout/IconLabelList"/>
@@ -2689,6 +2745,13 @@
         </dgm:presLayoutVars>
       </dgm:prSet>
       <dgm:spPr/>
+      <dgm:t>
+        <a:bodyPr/>
+        <a:lstStyle/>
+        <a:p>
+          <a:endParaRPr lang="en-IN"/>
+        </a:p>
+      </dgm:t>
     </dgm:pt>
     <dgm:pt modelId="{F1A0A717-258C-4ECB-A396-5403DAED3902}" type="pres">
       <dgm:prSet presAssocID="{40E165F1-198F-482A-B5F2-707F1BA9FB4B}" presName="linNode" presStyleCnt="0"/>
@@ -2702,6 +2765,13 @@
         </dgm:presLayoutVars>
       </dgm:prSet>
       <dgm:spPr/>
+      <dgm:t>
+        <a:bodyPr/>
+        <a:lstStyle/>
+        <a:p>
+          <a:endParaRPr lang="en-IN"/>
+        </a:p>
+      </dgm:t>
     </dgm:pt>
     <dgm:pt modelId="{1250AB2D-D0D0-4F0D-AFEE-3C8C92BF37A9}" type="pres">
       <dgm:prSet presAssocID="{40E165F1-198F-482A-B5F2-707F1BA9FB4B}" presName="descendantText" presStyleLbl="alignAccFollowNode1" presStyleIdx="0" presStyleCnt="2">
@@ -2710,6 +2780,13 @@
         </dgm:presLayoutVars>
       </dgm:prSet>
       <dgm:spPr/>
+      <dgm:t>
+        <a:bodyPr/>
+        <a:lstStyle/>
+        <a:p>
+          <a:endParaRPr lang="en-IN"/>
+        </a:p>
+      </dgm:t>
     </dgm:pt>
     <dgm:pt modelId="{C5D4FC2A-FFEA-4FA7-9215-A07FBD833A7D}" type="pres">
       <dgm:prSet presAssocID="{E7D7891A-1152-43FC-B101-D7F9DA570297}" presName="sp" presStyleCnt="0"/>
@@ -2727,6 +2804,13 @@
         </dgm:presLayoutVars>
       </dgm:prSet>
       <dgm:spPr/>
+      <dgm:t>
+        <a:bodyPr/>
+        <a:lstStyle/>
+        <a:p>
+          <a:endParaRPr lang="en-IN"/>
+        </a:p>
+      </dgm:t>
     </dgm:pt>
     <dgm:pt modelId="{EC7882A2-62C3-42D1-A923-3A12DAE8AAA5}" type="pres">
       <dgm:prSet presAssocID="{839BD412-8A94-46B4-AF1C-F1C30968B960}" presName="descendantText" presStyleLbl="alignAccFollowNode1" presStyleIdx="1" presStyleCnt="2">
@@ -2735,30 +2819,37 @@
         </dgm:presLayoutVars>
       </dgm:prSet>
       <dgm:spPr/>
+      <dgm:t>
+        <a:bodyPr/>
+        <a:lstStyle/>
+        <a:p>
+          <a:endParaRPr lang="en-IN"/>
+        </a:p>
+      </dgm:t>
     </dgm:pt>
   </dgm:ptLst>
   <dgm:cxnLst>
-    <dgm:cxn modelId="{AD76750B-B222-4D35-BDD7-29491CD6F605}" srcId="{839BD412-8A94-46B4-AF1C-F1C30968B960}" destId="{DF562830-69C3-4F01-8185-DC8E307BD2DF}" srcOrd="0" destOrd="0" parTransId="{F5797582-3771-4B0C-AC18-AB78CBE258F2}" sibTransId="{FCAEB1C8-8C63-4492-88F8-AA20D18FE575}"/>
+    <dgm:cxn modelId="{C796473C-28CF-4BF4-81D3-D1702D809108}" srcId="{839BD412-8A94-46B4-AF1C-F1C30968B960}" destId="{E7438B71-C314-4D3F-8684-DC5E4804DF5D}" srcOrd="1" destOrd="0" parTransId="{61E2D753-0D64-4747-9760-CE45D451136A}" sibTransId="{996E7965-2FD3-4E8B-8A24-102F3D409671}"/>
+    <dgm:cxn modelId="{36A1C791-A610-422F-8847-5E17DE7080C8}" type="presOf" srcId="{1C5CBCAC-80F9-4DAB-9CC7-0F53B719B40B}" destId="{0CCB9578-29DF-4A00-85C4-9BF0E206F412}" srcOrd="0" destOrd="0" presId="urn:microsoft.com/office/officeart/2016/7/layout/VerticalSolidActionList"/>
     <dgm:cxn modelId="{4EFD241F-99DE-4714-83A2-9AEEB539CE13}" srcId="{1C5CBCAC-80F9-4DAB-9CC7-0F53B719B40B}" destId="{839BD412-8A94-46B4-AF1C-F1C30968B960}" srcOrd="1" destOrd="0" parTransId="{5A9FB462-B430-4E9D-A3FE-9D462230530C}" sibTransId="{B8629847-102A-43C9-AA98-E4F29B865DF0}"/>
-    <dgm:cxn modelId="{99DF273C-26FD-4D40-8301-01474498013D}" type="presOf" srcId="{DF562830-69C3-4F01-8185-DC8E307BD2DF}" destId="{EC7882A2-62C3-42D1-A923-3A12DAE8AAA5}" srcOrd="0" destOrd="0" presId="urn:microsoft.com/office/officeart/2016/7/layout/VerticalSolidActionList"/>
-    <dgm:cxn modelId="{C796473C-28CF-4BF4-81D3-D1702D809108}" srcId="{839BD412-8A94-46B4-AF1C-F1C30968B960}" destId="{E7438B71-C314-4D3F-8684-DC5E4804DF5D}" srcOrd="1" destOrd="0" parTransId="{61E2D753-0D64-4747-9760-CE45D451136A}" sibTransId="{996E7965-2FD3-4E8B-8A24-102F3D409671}"/>
-    <dgm:cxn modelId="{45D6683F-2230-46FA-94CA-57C524BF90D0}" srcId="{40E165F1-198F-482A-B5F2-707F1BA9FB4B}" destId="{F5116970-BF6A-4D03-9623-047CB4438646}" srcOrd="0" destOrd="0" parTransId="{FA6D3E33-2FCD-4D04-BB44-7AC3652802D5}" sibTransId="{628E2D33-7013-4CC6-926C-3A2A05B55F95}"/>
+    <dgm:cxn modelId="{8FBB33F3-4143-4133-BD96-85B155F8377A}" type="presOf" srcId="{A5C9A240-24C9-4E1B-AA70-70CCEEA8F6F1}" destId="{1250AB2D-D0D0-4F0D-AFEE-3C8C92BF37A9}" srcOrd="0" destOrd="2" presId="urn:microsoft.com/office/officeart/2016/7/layout/VerticalSolidActionList"/>
     <dgm:cxn modelId="{8C407E5B-ED18-4188-ADA0-FB56E20FE322}" srcId="{40E165F1-198F-482A-B5F2-707F1BA9FB4B}" destId="{A563A30A-88BE-4270-9651-FE57FE4E53DC}" srcOrd="1" destOrd="0" parTransId="{6B21959A-25EB-4C81-BF7C-42B33047FA76}" sibTransId="{252CE225-02C1-4799-9D9E-603D948B597F}"/>
-    <dgm:cxn modelId="{E7D76460-2AC0-4260-99B7-10C52DBD8B86}" type="presOf" srcId="{07B9A2F7-91E7-4AB9-84B4-282CFE0E4D29}" destId="{1250AB2D-D0D0-4F0D-AFEE-3C8C92BF37A9}" srcOrd="0" destOrd="5" presId="urn:microsoft.com/office/officeart/2016/7/layout/VerticalSolidActionList"/>
+    <dgm:cxn modelId="{F94A444C-8AC2-4304-89D9-106B1C960105}" srcId="{40E165F1-198F-482A-B5F2-707F1BA9FB4B}" destId="{DD4EA941-B840-44FB-9477-B210AB8AFE83}" srcOrd="3" destOrd="0" parTransId="{F076ABDE-21D7-4DC3-AB12-2F7698E9B54D}" sibTransId="{6ED5BA0F-B5D9-4D2D-82E4-901A692D94A5}"/>
     <dgm:cxn modelId="{6F502862-56A6-4BEB-9704-DDAE3DD4ABED}" type="presOf" srcId="{DD4EA941-B840-44FB-9477-B210AB8AFE83}" destId="{1250AB2D-D0D0-4F0D-AFEE-3C8C92BF37A9}" srcOrd="0" destOrd="3" presId="urn:microsoft.com/office/officeart/2016/7/layout/VerticalSolidActionList"/>
-    <dgm:cxn modelId="{F94A444C-8AC2-4304-89D9-106B1C960105}" srcId="{40E165F1-198F-482A-B5F2-707F1BA9FB4B}" destId="{DD4EA941-B840-44FB-9477-B210AB8AFE83}" srcOrd="3" destOrd="0" parTransId="{F076ABDE-21D7-4DC3-AB12-2F7698E9B54D}" sibTransId="{6ED5BA0F-B5D9-4D2D-82E4-901A692D94A5}"/>
     <dgm:cxn modelId="{DEB20D6F-EA55-46D1-B3B8-88E53AD55862}" srcId="{40E165F1-198F-482A-B5F2-707F1BA9FB4B}" destId="{07B9A2F7-91E7-4AB9-84B4-282CFE0E4D29}" srcOrd="5" destOrd="0" parTransId="{116A3E8A-0194-4848-B9D2-B27B06E465EE}" sibTransId="{13229846-D168-48FC-B509-E3BCBFC3258C}"/>
+    <dgm:cxn modelId="{71D6AFEC-BB84-4A5B-8254-A36F59525FD7}" type="presOf" srcId="{E7438B71-C314-4D3F-8684-DC5E4804DF5D}" destId="{EC7882A2-62C3-42D1-A923-3A12DAE8AAA5}" srcOrd="0" destOrd="1" presId="urn:microsoft.com/office/officeart/2016/7/layout/VerticalSolidActionList"/>
+    <dgm:cxn modelId="{A111CB85-47DF-4D8C-BA1F-49F37882C2A8}" type="presOf" srcId="{839BD412-8A94-46B4-AF1C-F1C30968B960}" destId="{4F4AD87B-F0AE-48B8-9A30-80CA23EEFE2A}" srcOrd="0" destOrd="0" presId="urn:microsoft.com/office/officeart/2016/7/layout/VerticalSolidActionList"/>
     <dgm:cxn modelId="{97C35054-5FE9-4C44-89E3-9CCB74EB1ED5}" type="presOf" srcId="{A563A30A-88BE-4270-9651-FE57FE4E53DC}" destId="{1250AB2D-D0D0-4F0D-AFEE-3C8C92BF37A9}" srcOrd="0" destOrd="1" presId="urn:microsoft.com/office/officeart/2016/7/layout/VerticalSolidActionList"/>
     <dgm:cxn modelId="{A3763081-0FC0-476F-9552-E1CAD8D4EE20}" type="presOf" srcId="{34268F61-5DEA-4302-995E-F1BF4D32C6DE}" destId="{1250AB2D-D0D0-4F0D-AFEE-3C8C92BF37A9}" srcOrd="0" destOrd="4" presId="urn:microsoft.com/office/officeart/2016/7/layout/VerticalSolidActionList"/>
-    <dgm:cxn modelId="{A111CB85-47DF-4D8C-BA1F-49F37882C2A8}" type="presOf" srcId="{839BD412-8A94-46B4-AF1C-F1C30968B960}" destId="{4F4AD87B-F0AE-48B8-9A30-80CA23EEFE2A}" srcOrd="0" destOrd="0" presId="urn:microsoft.com/office/officeart/2016/7/layout/VerticalSolidActionList"/>
-    <dgm:cxn modelId="{36A1C791-A610-422F-8847-5E17DE7080C8}" type="presOf" srcId="{1C5CBCAC-80F9-4DAB-9CC7-0F53B719B40B}" destId="{0CCB9578-29DF-4A00-85C4-9BF0E206F412}" srcOrd="0" destOrd="0" presId="urn:microsoft.com/office/officeart/2016/7/layout/VerticalSolidActionList"/>
+    <dgm:cxn modelId="{D90267BD-9CCE-4365-B83D-82C3952FE341}" type="presOf" srcId="{40E165F1-198F-482A-B5F2-707F1BA9FB4B}" destId="{2B32FB96-62D6-4EC6-8345-CB5A457E0504}" srcOrd="0" destOrd="0" presId="urn:microsoft.com/office/officeart/2016/7/layout/VerticalSolidActionList"/>
     <dgm:cxn modelId="{FDE5C998-E0D0-45CD-ABCA-5232A70B60BB}" srcId="{40E165F1-198F-482A-B5F2-707F1BA9FB4B}" destId="{34268F61-5DEA-4302-995E-F1BF4D32C6DE}" srcOrd="4" destOrd="0" parTransId="{45556EA1-A382-489F-93CB-DA1D63C29581}" sibTransId="{7BCE7B06-EFBA-4950-8CE2-9203263C0752}"/>
+    <dgm:cxn modelId="{DAECC4DE-8F5C-497D-BAF8-5C5C02BB7585}" type="presOf" srcId="{F5116970-BF6A-4D03-9623-047CB4438646}" destId="{1250AB2D-D0D0-4F0D-AFEE-3C8C92BF37A9}" srcOrd="0" destOrd="0" presId="urn:microsoft.com/office/officeart/2016/7/layout/VerticalSolidActionList"/>
+    <dgm:cxn modelId="{929A57BB-1AFA-4AC9-A4A3-9D3258AD6998}" srcId="{1C5CBCAC-80F9-4DAB-9CC7-0F53B719B40B}" destId="{40E165F1-198F-482A-B5F2-707F1BA9FB4B}" srcOrd="0" destOrd="0" parTransId="{2D0E779C-FBC5-4E54-AED3-F4C55D56AE2B}" sibTransId="{E7D7891A-1152-43FC-B101-D7F9DA570297}"/>
+    <dgm:cxn modelId="{AD76750B-B222-4D35-BDD7-29491CD6F605}" srcId="{839BD412-8A94-46B4-AF1C-F1C30968B960}" destId="{DF562830-69C3-4F01-8185-DC8E307BD2DF}" srcOrd="0" destOrd="0" parTransId="{F5797582-3771-4B0C-AC18-AB78CBE258F2}" sibTransId="{FCAEB1C8-8C63-4492-88F8-AA20D18FE575}"/>
+    <dgm:cxn modelId="{E7D76460-2AC0-4260-99B7-10C52DBD8B86}" type="presOf" srcId="{07B9A2F7-91E7-4AB9-84B4-282CFE0E4D29}" destId="{1250AB2D-D0D0-4F0D-AFEE-3C8C92BF37A9}" srcOrd="0" destOrd="5" presId="urn:microsoft.com/office/officeart/2016/7/layout/VerticalSolidActionList"/>
+    <dgm:cxn modelId="{45D6683F-2230-46FA-94CA-57C524BF90D0}" srcId="{40E165F1-198F-482A-B5F2-707F1BA9FB4B}" destId="{F5116970-BF6A-4D03-9623-047CB4438646}" srcOrd="0" destOrd="0" parTransId="{FA6D3E33-2FCD-4D04-BB44-7AC3652802D5}" sibTransId="{628E2D33-7013-4CC6-926C-3A2A05B55F95}"/>
     <dgm:cxn modelId="{1935E3AB-5F08-4ACC-BA86-5DD0607071A0}" srcId="{40E165F1-198F-482A-B5F2-707F1BA9FB4B}" destId="{A5C9A240-24C9-4E1B-AA70-70CCEEA8F6F1}" srcOrd="2" destOrd="0" parTransId="{AAEDCC6E-8B14-4245-8012-079958DD93F1}" sibTransId="{B607381A-B518-42F2-906E-868C0A0A65BB}"/>
-    <dgm:cxn modelId="{929A57BB-1AFA-4AC9-A4A3-9D3258AD6998}" srcId="{1C5CBCAC-80F9-4DAB-9CC7-0F53B719B40B}" destId="{40E165F1-198F-482A-B5F2-707F1BA9FB4B}" srcOrd="0" destOrd="0" parTransId="{2D0E779C-FBC5-4E54-AED3-F4C55D56AE2B}" sibTransId="{E7D7891A-1152-43FC-B101-D7F9DA570297}"/>
-    <dgm:cxn modelId="{D90267BD-9CCE-4365-B83D-82C3952FE341}" type="presOf" srcId="{40E165F1-198F-482A-B5F2-707F1BA9FB4B}" destId="{2B32FB96-62D6-4EC6-8345-CB5A457E0504}" srcOrd="0" destOrd="0" presId="urn:microsoft.com/office/officeart/2016/7/layout/VerticalSolidActionList"/>
-    <dgm:cxn modelId="{DAECC4DE-8F5C-497D-BAF8-5C5C02BB7585}" type="presOf" srcId="{F5116970-BF6A-4D03-9623-047CB4438646}" destId="{1250AB2D-D0D0-4F0D-AFEE-3C8C92BF37A9}" srcOrd="0" destOrd="0" presId="urn:microsoft.com/office/officeart/2016/7/layout/VerticalSolidActionList"/>
-    <dgm:cxn modelId="{71D6AFEC-BB84-4A5B-8254-A36F59525FD7}" type="presOf" srcId="{E7438B71-C314-4D3F-8684-DC5E4804DF5D}" destId="{EC7882A2-62C3-42D1-A923-3A12DAE8AAA5}" srcOrd="0" destOrd="1" presId="urn:microsoft.com/office/officeart/2016/7/layout/VerticalSolidActionList"/>
-    <dgm:cxn modelId="{8FBB33F3-4143-4133-BD96-85B155F8377A}" type="presOf" srcId="{A5C9A240-24C9-4E1B-AA70-70CCEEA8F6F1}" destId="{1250AB2D-D0D0-4F0D-AFEE-3C8C92BF37A9}" srcOrd="0" destOrd="2" presId="urn:microsoft.com/office/officeart/2016/7/layout/VerticalSolidActionList"/>
+    <dgm:cxn modelId="{99DF273C-26FD-4D40-8301-01474498013D}" type="presOf" srcId="{DF562830-69C3-4F01-8185-DC8E307BD2DF}" destId="{EC7882A2-62C3-42D1-A923-3A12DAE8AAA5}" srcOrd="0" destOrd="0" presId="urn:microsoft.com/office/officeart/2016/7/layout/VerticalSolidActionList"/>
     <dgm:cxn modelId="{5E5983AA-431A-4953-B3C5-503AB7A065A0}" type="presParOf" srcId="{0CCB9578-29DF-4A00-85C4-9BF0E206F412}" destId="{F1A0A717-258C-4ECB-A396-5403DAED3902}" srcOrd="0" destOrd="0" presId="urn:microsoft.com/office/officeart/2016/7/layout/VerticalSolidActionList"/>
     <dgm:cxn modelId="{BA1B47B0-9B1A-4DDE-9A8C-AE666801A351}" type="presParOf" srcId="{F1A0A717-258C-4ECB-A396-5403DAED3902}" destId="{2B32FB96-62D6-4EC6-8345-CB5A457E0504}" srcOrd="0" destOrd="0" presId="urn:microsoft.com/office/officeart/2016/7/layout/VerticalSolidActionList"/>
     <dgm:cxn modelId="{C2C6BDFA-3EB3-464E-867F-EA11CDC147F5}" type="presParOf" srcId="{F1A0A717-258C-4ECB-A396-5403DAED3902}" destId="{1250AB2D-D0D0-4F0D-AFEE-3C8C92BF37A9}" srcOrd="1" destOrd="0" presId="urn:microsoft.com/office/officeart/2016/7/layout/VerticalSolidActionList"/>
@@ -2799,7 +2890,7 @@
           <a:avLst/>
         </a:prstGeom>
         <a:blipFill>
-          <a:blip xmlns:r="http://schemas.openxmlformats.org/officeDocument/2006/relationships" r:embed="rId1">
+          <a:blip xmlns:r="http://schemas.openxmlformats.org/officeDocument/2006/relationships" r:embed="rId1" cstate="print">
             <a:extLst>
               <a:ext uri="{28A0092B-C50C-407E-A947-70E740481C1C}">
                 <a14:useLocalDpi xmlns:a14="http://schemas.microsoft.com/office/drawing/2010/main" val="0"/>
@@ -2870,7 +2961,7 @@
         </a:bodyPr>
         <a:lstStyle/>
         <a:p>
-          <a:pPr marL="0" lvl="0" indent="0" algn="ctr" defTabSz="889000">
+          <a:pPr lvl="0" algn="ctr" defTabSz="889000">
             <a:lnSpc>
               <a:spcPct val="90000"/>
             </a:lnSpc>
@@ -2880,7 +2971,6 @@
             <a:spcAft>
               <a:spcPct val="35000"/>
             </a:spcAft>
-            <a:buNone/>
           </a:pPr>
           <a:r>
             <a:rPr lang="en-US" sz="2000" kern="1200" dirty="0"/>
@@ -2907,7 +2997,7 @@
           <a:avLst/>
         </a:prstGeom>
         <a:blipFill>
-          <a:blip xmlns:r="http://schemas.openxmlformats.org/officeDocument/2006/relationships" r:embed="rId2">
+          <a:blip xmlns:r="http://schemas.openxmlformats.org/officeDocument/2006/relationships" r:embed="rId2" cstate="print">
             <a:extLst>
               <a:ext uri="{28A0092B-C50C-407E-A947-70E740481C1C}">
                 <a14:useLocalDpi xmlns:a14="http://schemas.microsoft.com/office/drawing/2010/main" val="0"/>
@@ -2978,7 +3068,7 @@
         </a:bodyPr>
         <a:lstStyle/>
         <a:p>
-          <a:pPr marL="0" lvl="0" indent="0" algn="ctr" defTabSz="889000">
+          <a:pPr lvl="0" algn="ctr" defTabSz="889000">
             <a:lnSpc>
               <a:spcPct val="90000"/>
             </a:lnSpc>
@@ -2988,7 +3078,6 @@
             <a:spcAft>
               <a:spcPct val="35000"/>
             </a:spcAft>
-            <a:buNone/>
           </a:pPr>
           <a:r>
             <a:rPr lang="en-US" sz="2000" kern="1200" dirty="0">
@@ -3028,7 +3117,7 @@
                 <a14:useLocalDpi xmlns:a14="http://schemas.microsoft.com/office/drawing/2010/main" val="0"/>
               </a:ext>
               <a:ext uri="{96DAC541-7B7A-43D3-8B79-37D633B846F1}">
-                <asvg:svgBlip xmlns:asvg="http://schemas.microsoft.com/office/drawing/2016/SVG/main" r:embed="rId4"/>
+                <asvg:svgBlip xmlns:asvg="http://schemas.microsoft.com/office/drawing/2016/SVG/main" xmlns="" r:embed="rId4"/>
               </a:ext>
             </a:extLst>
           </a:blip>
@@ -3096,7 +3185,7 @@
         </a:bodyPr>
         <a:lstStyle/>
         <a:p>
-          <a:pPr marL="0" lvl="0" indent="0" algn="ctr" defTabSz="889000">
+          <a:pPr lvl="0" algn="ctr" defTabSz="889000">
             <a:lnSpc>
               <a:spcPct val="90000"/>
             </a:lnSpc>
@@ -3106,7 +3195,6 @@
             <a:spcAft>
               <a:spcPct val="35000"/>
             </a:spcAft>
-            <a:buNone/>
           </a:pPr>
           <a:r>
             <a:rPr lang="en-US" sz="2000" kern="1200" dirty="0"/>
@@ -3185,7 +3273,7 @@
         </a:bodyPr>
         <a:lstStyle/>
         <a:p>
-          <a:pPr marL="0" lvl="0" indent="0" algn="l" defTabSz="1066800">
+          <a:pPr lvl="0" algn="l" defTabSz="1066800">
             <a:lnSpc>
               <a:spcPct val="90000"/>
             </a:lnSpc>
@@ -3195,12 +3283,11 @@
             <a:spcAft>
               <a:spcPct val="35000"/>
             </a:spcAft>
-            <a:buNone/>
           </a:pPr>
           <a:endParaRPr lang="en-US" sz="2400" kern="1200"/>
         </a:p>
         <a:p>
-          <a:pPr marL="0" lvl="0" indent="0" algn="l" defTabSz="1066800">
+          <a:pPr lvl="0" algn="l" defTabSz="1066800">
             <a:lnSpc>
               <a:spcPct val="90000"/>
             </a:lnSpc>
@@ -3210,7 +3297,6 @@
             <a:spcAft>
               <a:spcPct val="35000"/>
             </a:spcAft>
-            <a:buNone/>
           </a:pPr>
           <a:r>
             <a:rPr lang="en-US" sz="2400" kern="1200"/>
@@ -3219,7 +3305,7 @@
           <a:endParaRPr lang="en-US" sz="2400" kern="1200" dirty="0"/>
         </a:p>
         <a:p>
-          <a:pPr marL="0" lvl="0" indent="0" algn="l" defTabSz="1066800">
+          <a:pPr lvl="0" algn="l" defTabSz="1066800">
             <a:lnSpc>
               <a:spcPct val="90000"/>
             </a:lnSpc>
@@ -3229,7 +3315,6 @@
             <a:spcAft>
               <a:spcPct val="35000"/>
             </a:spcAft>
-            <a:buNone/>
           </a:pPr>
           <a:r>
             <a:rPr lang="en-US" sz="2400" kern="1200"/>
@@ -3238,7 +3323,7 @@
           <a:endParaRPr lang="en-US" sz="2400" kern="1200" dirty="0"/>
         </a:p>
         <a:p>
-          <a:pPr marL="0" lvl="0" indent="0" algn="l" defTabSz="1066800">
+          <a:pPr lvl="0" algn="l" defTabSz="1066800">
             <a:lnSpc>
               <a:spcPct val="90000"/>
             </a:lnSpc>
@@ -3248,7 +3333,6 @@
             <a:spcAft>
               <a:spcPct val="35000"/>
             </a:spcAft>
-            <a:buNone/>
           </a:pPr>
           <a:r>
             <a:rPr lang="en-US" sz="2400" kern="1200"/>
@@ -3257,7 +3341,7 @@
           <a:endParaRPr lang="en-US" sz="2400" kern="1200" dirty="0"/>
         </a:p>
         <a:p>
-          <a:pPr marL="0" lvl="0" indent="0" algn="l" defTabSz="488950">
+          <a:pPr lvl="0" algn="l" defTabSz="488950">
             <a:lnSpc>
               <a:spcPct val="90000"/>
             </a:lnSpc>
@@ -3267,12 +3351,11 @@
             <a:spcAft>
               <a:spcPct val="35000"/>
             </a:spcAft>
-            <a:buNone/>
           </a:pPr>
           <a:endParaRPr lang="en-US" sz="1100" kern="1200"/>
         </a:p>
         <a:p>
-          <a:pPr marL="0" lvl="0" indent="0" algn="l" defTabSz="488950">
+          <a:pPr lvl="0" algn="l" defTabSz="488950">
             <a:lnSpc>
               <a:spcPct val="90000"/>
             </a:lnSpc>
@@ -3282,12 +3365,11 @@
             <a:spcAft>
               <a:spcPct val="35000"/>
             </a:spcAft>
-            <a:buNone/>
           </a:pPr>
           <a:endParaRPr lang="en-US" sz="1100" kern="1200"/>
         </a:p>
         <a:p>
-          <a:pPr marL="0" lvl="0" indent="0" algn="l" defTabSz="488950">
+          <a:pPr lvl="0" algn="l" defTabSz="488950">
             <a:lnSpc>
               <a:spcPct val="90000"/>
             </a:lnSpc>
@@ -3297,7 +3379,6 @@
             <a:spcAft>
               <a:spcPct val="35000"/>
             </a:spcAft>
-            <a:buNone/>
           </a:pPr>
           <a:endParaRPr lang="en-US" sz="1100" kern="1200"/>
         </a:p>
@@ -3357,7 +3438,7 @@
         </a:bodyPr>
         <a:lstStyle/>
         <a:p>
-          <a:pPr marL="0" lvl="0" indent="0" algn="ctr" defTabSz="1111250">
+          <a:pPr lvl="0" algn="ctr" defTabSz="1111250">
             <a:lnSpc>
               <a:spcPct val="90000"/>
             </a:lnSpc>
@@ -3367,7 +3448,6 @@
             <a:spcAft>
               <a:spcPct val="35000"/>
             </a:spcAft>
-            <a:buNone/>
             <a:defRPr b="1"/>
           </a:pPr>
           <a:r>
@@ -3438,7 +3518,7 @@
         </a:bodyPr>
         <a:lstStyle/>
         <a:p>
-          <a:pPr marL="0" lvl="0" indent="0" algn="l" defTabSz="889000">
+          <a:pPr lvl="0" algn="l" defTabSz="889000">
             <a:lnSpc>
               <a:spcPct val="100000"/>
             </a:lnSpc>
@@ -3448,7 +3528,6 @@
             <a:spcAft>
               <a:spcPct val="35000"/>
             </a:spcAft>
-            <a:buNone/>
           </a:pPr>
           <a:r>
             <a:rPr lang="en-US" sz="2000" kern="1200"/>
@@ -3456,7 +3535,7 @@
           </a:r>
         </a:p>
         <a:p>
-          <a:pPr marL="0" lvl="0" indent="0" algn="l" defTabSz="889000">
+          <a:pPr lvl="0" algn="l" defTabSz="889000">
             <a:lnSpc>
               <a:spcPct val="100000"/>
             </a:lnSpc>
@@ -3466,7 +3545,6 @@
             <a:spcAft>
               <a:spcPct val="35000"/>
             </a:spcAft>
-            <a:buNone/>
           </a:pPr>
           <a:r>
             <a:rPr lang="en-US" sz="2000" kern="1200"/>
@@ -3534,7 +3612,7 @@
         </a:bodyPr>
         <a:lstStyle/>
         <a:p>
-          <a:pPr marL="0" lvl="0" indent="0" algn="ctr" defTabSz="1111250">
+          <a:pPr lvl="0" algn="ctr" defTabSz="1111250">
             <a:lnSpc>
               <a:spcPct val="90000"/>
             </a:lnSpc>
@@ -3544,7 +3622,6 @@
             <a:spcAft>
               <a:spcPct val="35000"/>
             </a:spcAft>
-            <a:buNone/>
             <a:defRPr b="1"/>
           </a:pPr>
           <a:r>
@@ -3740,7 +3817,7 @@
   </dgm:layoutNode>
   <dgm:extLst>
     <a:ext uri="{68A01E43-0DF5-4B5B-8FA6-DAF915123BFB}">
-      <dgm1612:lstStyle xmlns:dgm1612="http://schemas.microsoft.com/office/drawing/2016/12/diagram">
+      <dgm1612:lstStyle xmlns:dgm1612="http://schemas.microsoft.com/office/drawing/2016/12/diagram" xmlns="">
         <a:lvl1pPr>
           <a:lnSpc>
             <a:spcPct val="100000"/>
@@ -6076,7 +6153,7 @@
           <p:cNvPr id="2" name="Title 1">
             <a:extLst>
               <a:ext uri="{FF2B5EF4-FFF2-40B4-BE49-F238E27FC236}">
-                <a16:creationId xmlns:a16="http://schemas.microsoft.com/office/drawing/2014/main" id="{2FA4B297-6868-41FC-8DD7-A09726BD1225}"/>
+                <a16:creationId xmlns:a16="http://schemas.microsoft.com/office/drawing/2014/main" xmlns="" id="{2FA4B297-6868-41FC-8DD7-A09726BD1225}"/>
               </a:ext>
             </a:extLst>
           </p:cNvPr>
@@ -6114,7 +6191,7 @@
           <p:cNvPr id="3" name="Subtitle 2">
             <a:extLst>
               <a:ext uri="{FF2B5EF4-FFF2-40B4-BE49-F238E27FC236}">
-                <a16:creationId xmlns:a16="http://schemas.microsoft.com/office/drawing/2014/main" id="{0E8F4D4A-130A-4581-A058-E47976E43805}"/>
+                <a16:creationId xmlns:a16="http://schemas.microsoft.com/office/drawing/2014/main" xmlns="" id="{0E8F4D4A-130A-4581-A058-E47976E43805}"/>
               </a:ext>
             </a:extLst>
           </p:cNvPr>
@@ -6185,7 +6262,7 @@
           <p:cNvPr id="4" name="Date Placeholder 3">
             <a:extLst>
               <a:ext uri="{FF2B5EF4-FFF2-40B4-BE49-F238E27FC236}">
-                <a16:creationId xmlns:a16="http://schemas.microsoft.com/office/drawing/2014/main" id="{30FB1A87-8BC6-44D9-88B1-078BB7BC6D3A}"/>
+                <a16:creationId xmlns:a16="http://schemas.microsoft.com/office/drawing/2014/main" xmlns="" id="{30FB1A87-8BC6-44D9-88B1-078BB7BC6D3A}"/>
               </a:ext>
             </a:extLst>
           </p:cNvPr>
@@ -6214,7 +6291,7 @@
           <p:cNvPr id="5" name="Footer Placeholder 4">
             <a:extLst>
               <a:ext uri="{FF2B5EF4-FFF2-40B4-BE49-F238E27FC236}">
-                <a16:creationId xmlns:a16="http://schemas.microsoft.com/office/drawing/2014/main" id="{33919945-B822-4172-87F5-2471ECB9CF5B}"/>
+                <a16:creationId xmlns:a16="http://schemas.microsoft.com/office/drawing/2014/main" xmlns="" id="{33919945-B822-4172-87F5-2471ECB9CF5B}"/>
               </a:ext>
             </a:extLst>
           </p:cNvPr>
@@ -6239,7 +6316,7 @@
           <p:cNvPr id="6" name="Slide Number Placeholder 5">
             <a:extLst>
               <a:ext uri="{FF2B5EF4-FFF2-40B4-BE49-F238E27FC236}">
-                <a16:creationId xmlns:a16="http://schemas.microsoft.com/office/drawing/2014/main" id="{E5456D0C-1392-44EF-91D5-C87E1EFACC9B}"/>
+                <a16:creationId xmlns:a16="http://schemas.microsoft.com/office/drawing/2014/main" xmlns="" id="{E5456D0C-1392-44EF-91D5-C87E1EFACC9B}"/>
               </a:ext>
             </a:extLst>
           </p:cNvPr>
@@ -6298,7 +6375,7 @@
           <p:cNvPr id="2" name="Title 1">
             <a:extLst>
               <a:ext uri="{FF2B5EF4-FFF2-40B4-BE49-F238E27FC236}">
-                <a16:creationId xmlns:a16="http://schemas.microsoft.com/office/drawing/2014/main" id="{BABEC38C-7619-4B33-BBC1-3003EBAD306E}"/>
+                <a16:creationId xmlns:a16="http://schemas.microsoft.com/office/drawing/2014/main" xmlns="" id="{BABEC38C-7619-4B33-BBC1-3003EBAD306E}"/>
               </a:ext>
             </a:extLst>
           </p:cNvPr>
@@ -6327,7 +6404,7 @@
           <p:cNvPr id="3" name="Vertical Text Placeholder 2">
             <a:extLst>
               <a:ext uri="{FF2B5EF4-FFF2-40B4-BE49-F238E27FC236}">
-                <a16:creationId xmlns:a16="http://schemas.microsoft.com/office/drawing/2014/main" id="{1327EF92-9F3B-4BA6-A988-901DC6F5B041}"/>
+                <a16:creationId xmlns:a16="http://schemas.microsoft.com/office/drawing/2014/main" xmlns="" id="{1327EF92-9F3B-4BA6-A988-901DC6F5B041}"/>
               </a:ext>
             </a:extLst>
           </p:cNvPr>
@@ -6385,7 +6462,7 @@
           <p:cNvPr id="4" name="Date Placeholder 3">
             <a:extLst>
               <a:ext uri="{FF2B5EF4-FFF2-40B4-BE49-F238E27FC236}">
-                <a16:creationId xmlns:a16="http://schemas.microsoft.com/office/drawing/2014/main" id="{7644026B-322C-4B4C-937F-245D331E3EEA}"/>
+                <a16:creationId xmlns:a16="http://schemas.microsoft.com/office/drawing/2014/main" xmlns="" id="{7644026B-322C-4B4C-937F-245D331E3EEA}"/>
               </a:ext>
             </a:extLst>
           </p:cNvPr>
@@ -6414,7 +6491,7 @@
           <p:cNvPr id="5" name="Footer Placeholder 4">
             <a:extLst>
               <a:ext uri="{FF2B5EF4-FFF2-40B4-BE49-F238E27FC236}">
-                <a16:creationId xmlns:a16="http://schemas.microsoft.com/office/drawing/2014/main" id="{2CD2135E-51DA-40BE-9346-2ED84D78F40E}"/>
+                <a16:creationId xmlns:a16="http://schemas.microsoft.com/office/drawing/2014/main" xmlns="" id="{2CD2135E-51DA-40BE-9346-2ED84D78F40E}"/>
               </a:ext>
             </a:extLst>
           </p:cNvPr>
@@ -6439,7 +6516,7 @@
           <p:cNvPr id="6" name="Slide Number Placeholder 5">
             <a:extLst>
               <a:ext uri="{FF2B5EF4-FFF2-40B4-BE49-F238E27FC236}">
-                <a16:creationId xmlns:a16="http://schemas.microsoft.com/office/drawing/2014/main" id="{1FD86EA1-2C08-4A0B-BEA0-B9D46AF11CC6}"/>
+                <a16:creationId xmlns:a16="http://schemas.microsoft.com/office/drawing/2014/main" xmlns="" id="{1FD86EA1-2C08-4A0B-BEA0-B9D46AF11CC6}"/>
               </a:ext>
             </a:extLst>
           </p:cNvPr>
@@ -6498,7 +6575,7 @@
           <p:cNvPr id="2" name="Vertical Title 1">
             <a:extLst>
               <a:ext uri="{FF2B5EF4-FFF2-40B4-BE49-F238E27FC236}">
-                <a16:creationId xmlns:a16="http://schemas.microsoft.com/office/drawing/2014/main" id="{5F94D87B-2EC0-41F8-989D-AF3B72FD0905}"/>
+                <a16:creationId xmlns:a16="http://schemas.microsoft.com/office/drawing/2014/main" xmlns="" id="{5F94D87B-2EC0-41F8-989D-AF3B72FD0905}"/>
               </a:ext>
             </a:extLst>
           </p:cNvPr>
@@ -6532,7 +6609,7 @@
           <p:cNvPr id="3" name="Vertical Text Placeholder 2">
             <a:extLst>
               <a:ext uri="{FF2B5EF4-FFF2-40B4-BE49-F238E27FC236}">
-                <a16:creationId xmlns:a16="http://schemas.microsoft.com/office/drawing/2014/main" id="{79FD629C-FA3F-4C2C-86AF-4EF0B740F2E9}"/>
+                <a16:creationId xmlns:a16="http://schemas.microsoft.com/office/drawing/2014/main" xmlns="" id="{79FD629C-FA3F-4C2C-86AF-4EF0B740F2E9}"/>
               </a:ext>
             </a:extLst>
           </p:cNvPr>
@@ -6595,7 +6672,7 @@
           <p:cNvPr id="4" name="Date Placeholder 3">
             <a:extLst>
               <a:ext uri="{FF2B5EF4-FFF2-40B4-BE49-F238E27FC236}">
-                <a16:creationId xmlns:a16="http://schemas.microsoft.com/office/drawing/2014/main" id="{4E09CCF9-677B-443A-85E8-D0EE9325FA42}"/>
+                <a16:creationId xmlns:a16="http://schemas.microsoft.com/office/drawing/2014/main" xmlns="" id="{4E09CCF9-677B-443A-85E8-D0EE9325FA42}"/>
               </a:ext>
             </a:extLst>
           </p:cNvPr>
@@ -6624,7 +6701,7 @@
           <p:cNvPr id="5" name="Footer Placeholder 4">
             <a:extLst>
               <a:ext uri="{FF2B5EF4-FFF2-40B4-BE49-F238E27FC236}">
-                <a16:creationId xmlns:a16="http://schemas.microsoft.com/office/drawing/2014/main" id="{5C401347-8DBA-4A31-B3CC-DAEDD2CB20BF}"/>
+                <a16:creationId xmlns:a16="http://schemas.microsoft.com/office/drawing/2014/main" xmlns="" id="{5C401347-8DBA-4A31-B3CC-DAEDD2CB20BF}"/>
               </a:ext>
             </a:extLst>
           </p:cNvPr>
@@ -6649,7 +6726,7 @@
           <p:cNvPr id="6" name="Slide Number Placeholder 5">
             <a:extLst>
               <a:ext uri="{FF2B5EF4-FFF2-40B4-BE49-F238E27FC236}">
-                <a16:creationId xmlns:a16="http://schemas.microsoft.com/office/drawing/2014/main" id="{6EBC7EAE-0ADE-42F1-9C26-702A42A98FD3}"/>
+                <a16:creationId xmlns:a16="http://schemas.microsoft.com/office/drawing/2014/main" xmlns="" id="{6EBC7EAE-0ADE-42F1-9C26-702A42A98FD3}"/>
               </a:ext>
             </a:extLst>
           </p:cNvPr>
@@ -6708,7 +6785,7 @@
           <p:cNvPr id="2" name="Title 1">
             <a:extLst>
               <a:ext uri="{FF2B5EF4-FFF2-40B4-BE49-F238E27FC236}">
-                <a16:creationId xmlns:a16="http://schemas.microsoft.com/office/drawing/2014/main" id="{22FA7C74-A8C5-4F77-A24C-48B88B72FC34}"/>
+                <a16:creationId xmlns:a16="http://schemas.microsoft.com/office/drawing/2014/main" xmlns="" id="{22FA7C74-A8C5-4F77-A24C-48B88B72FC34}"/>
               </a:ext>
             </a:extLst>
           </p:cNvPr>
@@ -6737,7 +6814,7 @@
           <p:cNvPr id="3" name="Content Placeholder 2">
             <a:extLst>
               <a:ext uri="{FF2B5EF4-FFF2-40B4-BE49-F238E27FC236}">
-                <a16:creationId xmlns:a16="http://schemas.microsoft.com/office/drawing/2014/main" id="{28B76E1A-8C56-4F38-89DF-2621CD7ACEB7}"/>
+                <a16:creationId xmlns:a16="http://schemas.microsoft.com/office/drawing/2014/main" xmlns="" id="{28B76E1A-8C56-4F38-89DF-2621CD7ACEB7}"/>
               </a:ext>
             </a:extLst>
           </p:cNvPr>
@@ -6795,7 +6872,7 @@
           <p:cNvPr id="4" name="Date Placeholder 3">
             <a:extLst>
               <a:ext uri="{FF2B5EF4-FFF2-40B4-BE49-F238E27FC236}">
-                <a16:creationId xmlns:a16="http://schemas.microsoft.com/office/drawing/2014/main" id="{6575253B-3F75-4CB3-958C-706FB30DE060}"/>
+                <a16:creationId xmlns:a16="http://schemas.microsoft.com/office/drawing/2014/main" xmlns="" id="{6575253B-3F75-4CB3-958C-706FB30DE060}"/>
               </a:ext>
             </a:extLst>
           </p:cNvPr>
@@ -6824,7 +6901,7 @@
           <p:cNvPr id="5" name="Footer Placeholder 4">
             <a:extLst>
               <a:ext uri="{FF2B5EF4-FFF2-40B4-BE49-F238E27FC236}">
-                <a16:creationId xmlns:a16="http://schemas.microsoft.com/office/drawing/2014/main" id="{E2133545-6533-40C6-B721-E8528FA35897}"/>
+                <a16:creationId xmlns:a16="http://schemas.microsoft.com/office/drawing/2014/main" xmlns="" id="{E2133545-6533-40C6-B721-E8528FA35897}"/>
               </a:ext>
             </a:extLst>
           </p:cNvPr>
@@ -6849,7 +6926,7 @@
           <p:cNvPr id="6" name="Slide Number Placeholder 5">
             <a:extLst>
               <a:ext uri="{FF2B5EF4-FFF2-40B4-BE49-F238E27FC236}">
-                <a16:creationId xmlns:a16="http://schemas.microsoft.com/office/drawing/2014/main" id="{F1DFA54F-E35E-43C3-AD6B-B2895A4A7DDD}"/>
+                <a16:creationId xmlns:a16="http://schemas.microsoft.com/office/drawing/2014/main" xmlns="" id="{F1DFA54F-E35E-43C3-AD6B-B2895A4A7DDD}"/>
               </a:ext>
             </a:extLst>
           </p:cNvPr>
@@ -6908,7 +6985,7 @@
           <p:cNvPr id="2" name="Title 1">
             <a:extLst>
               <a:ext uri="{FF2B5EF4-FFF2-40B4-BE49-F238E27FC236}">
-                <a16:creationId xmlns:a16="http://schemas.microsoft.com/office/drawing/2014/main" id="{B0F48469-0D8C-4987-9D3D-73A603B8B766}"/>
+                <a16:creationId xmlns:a16="http://schemas.microsoft.com/office/drawing/2014/main" xmlns="" id="{B0F48469-0D8C-4987-9D3D-73A603B8B766}"/>
               </a:ext>
             </a:extLst>
           </p:cNvPr>
@@ -6946,7 +7023,7 @@
           <p:cNvPr id="3" name="Text Placeholder 2">
             <a:extLst>
               <a:ext uri="{FF2B5EF4-FFF2-40B4-BE49-F238E27FC236}">
-                <a16:creationId xmlns:a16="http://schemas.microsoft.com/office/drawing/2014/main" id="{66FD77A8-77F3-4C5F-9357-D59522714639}"/>
+                <a16:creationId xmlns:a16="http://schemas.microsoft.com/office/drawing/2014/main" xmlns="" id="{66FD77A8-77F3-4C5F-9357-D59522714639}"/>
               </a:ext>
             </a:extLst>
           </p:cNvPr>
@@ -7071,7 +7148,7 @@
           <p:cNvPr id="4" name="Date Placeholder 3">
             <a:extLst>
               <a:ext uri="{FF2B5EF4-FFF2-40B4-BE49-F238E27FC236}">
-                <a16:creationId xmlns:a16="http://schemas.microsoft.com/office/drawing/2014/main" id="{3815D8A0-AA17-4CAB-9452-08D7699C2E7E}"/>
+                <a16:creationId xmlns:a16="http://schemas.microsoft.com/office/drawing/2014/main" xmlns="" id="{3815D8A0-AA17-4CAB-9452-08D7699C2E7E}"/>
               </a:ext>
             </a:extLst>
           </p:cNvPr>
@@ -7100,7 +7177,7 @@
           <p:cNvPr id="5" name="Footer Placeholder 4">
             <a:extLst>
               <a:ext uri="{FF2B5EF4-FFF2-40B4-BE49-F238E27FC236}">
-                <a16:creationId xmlns:a16="http://schemas.microsoft.com/office/drawing/2014/main" id="{07437708-0554-420F-90CA-E41845AFC481}"/>
+                <a16:creationId xmlns:a16="http://schemas.microsoft.com/office/drawing/2014/main" xmlns="" id="{07437708-0554-420F-90CA-E41845AFC481}"/>
               </a:ext>
             </a:extLst>
           </p:cNvPr>
@@ -7125,7 +7202,7 @@
           <p:cNvPr id="6" name="Slide Number Placeholder 5">
             <a:extLst>
               <a:ext uri="{FF2B5EF4-FFF2-40B4-BE49-F238E27FC236}">
-                <a16:creationId xmlns:a16="http://schemas.microsoft.com/office/drawing/2014/main" id="{084F436A-7227-4AFC-9D3A-7302A4AF7A1B}"/>
+                <a16:creationId xmlns:a16="http://schemas.microsoft.com/office/drawing/2014/main" xmlns="" id="{084F436A-7227-4AFC-9D3A-7302A4AF7A1B}"/>
               </a:ext>
             </a:extLst>
           </p:cNvPr>
@@ -7184,7 +7261,7 @@
           <p:cNvPr id="2" name="Title 1">
             <a:extLst>
               <a:ext uri="{FF2B5EF4-FFF2-40B4-BE49-F238E27FC236}">
-                <a16:creationId xmlns:a16="http://schemas.microsoft.com/office/drawing/2014/main" id="{37DBE936-D2CA-40A9-B037-41F672FD178E}"/>
+                <a16:creationId xmlns:a16="http://schemas.microsoft.com/office/drawing/2014/main" xmlns="" id="{37DBE936-D2CA-40A9-B037-41F672FD178E}"/>
               </a:ext>
             </a:extLst>
           </p:cNvPr>
@@ -7213,7 +7290,7 @@
           <p:cNvPr id="3" name="Content Placeholder 2">
             <a:extLst>
               <a:ext uri="{FF2B5EF4-FFF2-40B4-BE49-F238E27FC236}">
-                <a16:creationId xmlns:a16="http://schemas.microsoft.com/office/drawing/2014/main" id="{A7131682-4F0F-4112-8B85-3B048E12792C}"/>
+                <a16:creationId xmlns:a16="http://schemas.microsoft.com/office/drawing/2014/main" xmlns="" id="{A7131682-4F0F-4112-8B85-3B048E12792C}"/>
               </a:ext>
             </a:extLst>
           </p:cNvPr>
@@ -7276,7 +7353,7 @@
           <p:cNvPr id="4" name="Content Placeholder 3">
             <a:extLst>
               <a:ext uri="{FF2B5EF4-FFF2-40B4-BE49-F238E27FC236}">
-                <a16:creationId xmlns:a16="http://schemas.microsoft.com/office/drawing/2014/main" id="{9ABF5CE7-856B-4BF3-8C52-7F53B36A773F}"/>
+                <a16:creationId xmlns:a16="http://schemas.microsoft.com/office/drawing/2014/main" xmlns="" id="{9ABF5CE7-856B-4BF3-8C52-7F53B36A773F}"/>
               </a:ext>
             </a:extLst>
           </p:cNvPr>
@@ -7339,7 +7416,7 @@
           <p:cNvPr id="5" name="Date Placeholder 4">
             <a:extLst>
               <a:ext uri="{FF2B5EF4-FFF2-40B4-BE49-F238E27FC236}">
-                <a16:creationId xmlns:a16="http://schemas.microsoft.com/office/drawing/2014/main" id="{EC88B7B7-B34A-4F4E-830C-35152124DA2C}"/>
+                <a16:creationId xmlns:a16="http://schemas.microsoft.com/office/drawing/2014/main" xmlns="" id="{EC88B7B7-B34A-4F4E-830C-35152124DA2C}"/>
               </a:ext>
             </a:extLst>
           </p:cNvPr>
@@ -7368,7 +7445,7 @@
           <p:cNvPr id="6" name="Footer Placeholder 5">
             <a:extLst>
               <a:ext uri="{FF2B5EF4-FFF2-40B4-BE49-F238E27FC236}">
-                <a16:creationId xmlns:a16="http://schemas.microsoft.com/office/drawing/2014/main" id="{0723B888-8AF8-4014-B627-4A75A394739A}"/>
+                <a16:creationId xmlns:a16="http://schemas.microsoft.com/office/drawing/2014/main" xmlns="" id="{0723B888-8AF8-4014-B627-4A75A394739A}"/>
               </a:ext>
             </a:extLst>
           </p:cNvPr>
@@ -7393,7 +7470,7 @@
           <p:cNvPr id="7" name="Slide Number Placeholder 6">
             <a:extLst>
               <a:ext uri="{FF2B5EF4-FFF2-40B4-BE49-F238E27FC236}">
-                <a16:creationId xmlns:a16="http://schemas.microsoft.com/office/drawing/2014/main" id="{CBE7D68B-90D7-4998-91AA-74890A58FB29}"/>
+                <a16:creationId xmlns:a16="http://schemas.microsoft.com/office/drawing/2014/main" xmlns="" id="{CBE7D68B-90D7-4998-91AA-74890A58FB29}"/>
               </a:ext>
             </a:extLst>
           </p:cNvPr>
@@ -7452,7 +7529,7 @@
           <p:cNvPr id="2" name="Title 1">
             <a:extLst>
               <a:ext uri="{FF2B5EF4-FFF2-40B4-BE49-F238E27FC236}">
-                <a16:creationId xmlns:a16="http://schemas.microsoft.com/office/drawing/2014/main" id="{750766AC-6141-4FC5-866C-44EBA4FB2009}"/>
+                <a16:creationId xmlns:a16="http://schemas.microsoft.com/office/drawing/2014/main" xmlns="" id="{750766AC-6141-4FC5-866C-44EBA4FB2009}"/>
               </a:ext>
             </a:extLst>
           </p:cNvPr>
@@ -7486,7 +7563,7 @@
           <p:cNvPr id="3" name="Text Placeholder 2">
             <a:extLst>
               <a:ext uri="{FF2B5EF4-FFF2-40B4-BE49-F238E27FC236}">
-                <a16:creationId xmlns:a16="http://schemas.microsoft.com/office/drawing/2014/main" id="{A9778FFA-67A7-445D-B9F6-7A6DCB4CDA7A}"/>
+                <a16:creationId xmlns:a16="http://schemas.microsoft.com/office/drawing/2014/main" xmlns="" id="{A9778FFA-67A7-445D-B9F6-7A6DCB4CDA7A}"/>
               </a:ext>
             </a:extLst>
           </p:cNvPr>
@@ -7557,7 +7634,7 @@
           <p:cNvPr id="4" name="Content Placeholder 3">
             <a:extLst>
               <a:ext uri="{FF2B5EF4-FFF2-40B4-BE49-F238E27FC236}">
-                <a16:creationId xmlns:a16="http://schemas.microsoft.com/office/drawing/2014/main" id="{6E66B480-8AEA-4053-AEBD-51561B14140D}"/>
+                <a16:creationId xmlns:a16="http://schemas.microsoft.com/office/drawing/2014/main" xmlns="" id="{6E66B480-8AEA-4053-AEBD-51561B14140D}"/>
               </a:ext>
             </a:extLst>
           </p:cNvPr>
@@ -7620,7 +7697,7 @@
           <p:cNvPr id="5" name="Text Placeholder 4">
             <a:extLst>
               <a:ext uri="{FF2B5EF4-FFF2-40B4-BE49-F238E27FC236}">
-                <a16:creationId xmlns:a16="http://schemas.microsoft.com/office/drawing/2014/main" id="{AF878F49-FF5C-45F8-80E7-F033A96F2A3C}"/>
+                <a16:creationId xmlns:a16="http://schemas.microsoft.com/office/drawing/2014/main" xmlns="" id="{AF878F49-FF5C-45F8-80E7-F033A96F2A3C}"/>
               </a:ext>
             </a:extLst>
           </p:cNvPr>
@@ -7691,7 +7768,7 @@
           <p:cNvPr id="6" name="Content Placeholder 5">
             <a:extLst>
               <a:ext uri="{FF2B5EF4-FFF2-40B4-BE49-F238E27FC236}">
-                <a16:creationId xmlns:a16="http://schemas.microsoft.com/office/drawing/2014/main" id="{A67DDC90-3806-48DB-983D-AFACE3A2C399}"/>
+                <a16:creationId xmlns:a16="http://schemas.microsoft.com/office/drawing/2014/main" xmlns="" id="{A67DDC90-3806-48DB-983D-AFACE3A2C399}"/>
               </a:ext>
             </a:extLst>
           </p:cNvPr>
@@ -7754,7 +7831,7 @@
           <p:cNvPr id="7" name="Date Placeholder 6">
             <a:extLst>
               <a:ext uri="{FF2B5EF4-FFF2-40B4-BE49-F238E27FC236}">
-                <a16:creationId xmlns:a16="http://schemas.microsoft.com/office/drawing/2014/main" id="{C771CA78-5AB7-461F-94AA-3918380316BD}"/>
+                <a16:creationId xmlns:a16="http://schemas.microsoft.com/office/drawing/2014/main" xmlns="" id="{C771CA78-5AB7-461F-94AA-3918380316BD}"/>
               </a:ext>
             </a:extLst>
           </p:cNvPr>
@@ -7783,7 +7860,7 @@
           <p:cNvPr id="8" name="Footer Placeholder 7">
             <a:extLst>
               <a:ext uri="{FF2B5EF4-FFF2-40B4-BE49-F238E27FC236}">
-                <a16:creationId xmlns:a16="http://schemas.microsoft.com/office/drawing/2014/main" id="{0ABDEF94-637F-44BB-AF15-52D4AAAEB2CF}"/>
+                <a16:creationId xmlns:a16="http://schemas.microsoft.com/office/drawing/2014/main" xmlns="" id="{0ABDEF94-637F-44BB-AF15-52D4AAAEB2CF}"/>
               </a:ext>
             </a:extLst>
           </p:cNvPr>
@@ -7808,7 +7885,7 @@
           <p:cNvPr id="9" name="Slide Number Placeholder 8">
             <a:extLst>
               <a:ext uri="{FF2B5EF4-FFF2-40B4-BE49-F238E27FC236}">
-                <a16:creationId xmlns:a16="http://schemas.microsoft.com/office/drawing/2014/main" id="{6FA74265-63C4-45D6-A2DD-727CD88826AD}"/>
+                <a16:creationId xmlns:a16="http://schemas.microsoft.com/office/drawing/2014/main" xmlns="" id="{6FA74265-63C4-45D6-A2DD-727CD88826AD}"/>
               </a:ext>
             </a:extLst>
           </p:cNvPr>
@@ -7867,7 +7944,7 @@
           <p:cNvPr id="2" name="Title 1">
             <a:extLst>
               <a:ext uri="{FF2B5EF4-FFF2-40B4-BE49-F238E27FC236}">
-                <a16:creationId xmlns:a16="http://schemas.microsoft.com/office/drawing/2014/main" id="{D199D5AC-C909-497E-8423-EA506A0A44C8}"/>
+                <a16:creationId xmlns:a16="http://schemas.microsoft.com/office/drawing/2014/main" xmlns="" id="{D199D5AC-C909-497E-8423-EA506A0A44C8}"/>
               </a:ext>
             </a:extLst>
           </p:cNvPr>
@@ -7896,7 +7973,7 @@
           <p:cNvPr id="3" name="Date Placeholder 2">
             <a:extLst>
               <a:ext uri="{FF2B5EF4-FFF2-40B4-BE49-F238E27FC236}">
-                <a16:creationId xmlns:a16="http://schemas.microsoft.com/office/drawing/2014/main" id="{7BFC7CDB-77AC-4F0C-ACCB-80678FFFE8AE}"/>
+                <a16:creationId xmlns:a16="http://schemas.microsoft.com/office/drawing/2014/main" xmlns="" id="{7BFC7CDB-77AC-4F0C-ACCB-80678FFFE8AE}"/>
               </a:ext>
             </a:extLst>
           </p:cNvPr>
@@ -7925,7 +8002,7 @@
           <p:cNvPr id="4" name="Footer Placeholder 3">
             <a:extLst>
               <a:ext uri="{FF2B5EF4-FFF2-40B4-BE49-F238E27FC236}">
-                <a16:creationId xmlns:a16="http://schemas.microsoft.com/office/drawing/2014/main" id="{1185E54F-3138-4C4A-9680-0C926560CF25}"/>
+                <a16:creationId xmlns:a16="http://schemas.microsoft.com/office/drawing/2014/main" xmlns="" id="{1185E54F-3138-4C4A-9680-0C926560CF25}"/>
               </a:ext>
             </a:extLst>
           </p:cNvPr>
@@ -7950,7 +8027,7 @@
           <p:cNvPr id="5" name="Slide Number Placeholder 4">
             <a:extLst>
               <a:ext uri="{FF2B5EF4-FFF2-40B4-BE49-F238E27FC236}">
-                <a16:creationId xmlns:a16="http://schemas.microsoft.com/office/drawing/2014/main" id="{A99D374A-6979-474C-B97E-7C5778FA0AF5}"/>
+                <a16:creationId xmlns:a16="http://schemas.microsoft.com/office/drawing/2014/main" xmlns="" id="{A99D374A-6979-474C-B97E-7C5778FA0AF5}"/>
               </a:ext>
             </a:extLst>
           </p:cNvPr>
@@ -8009,7 +8086,7 @@
           <p:cNvPr id="2" name="Date Placeholder 1">
             <a:extLst>
               <a:ext uri="{FF2B5EF4-FFF2-40B4-BE49-F238E27FC236}">
-                <a16:creationId xmlns:a16="http://schemas.microsoft.com/office/drawing/2014/main" id="{643F69AF-7352-4599-A6DA-5090A241F348}"/>
+                <a16:creationId xmlns:a16="http://schemas.microsoft.com/office/drawing/2014/main" xmlns="" id="{643F69AF-7352-4599-A6DA-5090A241F348}"/>
               </a:ext>
             </a:extLst>
           </p:cNvPr>
@@ -8038,7 +8115,7 @@
           <p:cNvPr id="3" name="Footer Placeholder 2">
             <a:extLst>
               <a:ext uri="{FF2B5EF4-FFF2-40B4-BE49-F238E27FC236}">
-                <a16:creationId xmlns:a16="http://schemas.microsoft.com/office/drawing/2014/main" id="{4EF32338-6053-43DD-9792-99347A316EF3}"/>
+                <a16:creationId xmlns:a16="http://schemas.microsoft.com/office/drawing/2014/main" xmlns="" id="{4EF32338-6053-43DD-9792-99347A316EF3}"/>
               </a:ext>
             </a:extLst>
           </p:cNvPr>
@@ -8063,7 +8140,7 @@
           <p:cNvPr id="4" name="Slide Number Placeholder 3">
             <a:extLst>
               <a:ext uri="{FF2B5EF4-FFF2-40B4-BE49-F238E27FC236}">
-                <a16:creationId xmlns:a16="http://schemas.microsoft.com/office/drawing/2014/main" id="{667F5DEF-2755-4A12-B442-28816F78F7FD}"/>
+                <a16:creationId xmlns:a16="http://schemas.microsoft.com/office/drawing/2014/main" xmlns="" id="{667F5DEF-2755-4A12-B442-28816F78F7FD}"/>
               </a:ext>
             </a:extLst>
           </p:cNvPr>
@@ -8122,7 +8199,7 @@
           <p:cNvPr id="2" name="Title 1">
             <a:extLst>
               <a:ext uri="{FF2B5EF4-FFF2-40B4-BE49-F238E27FC236}">
-                <a16:creationId xmlns:a16="http://schemas.microsoft.com/office/drawing/2014/main" id="{E076C111-6E88-46C4-BCA8-9679A052DE3E}"/>
+                <a16:creationId xmlns:a16="http://schemas.microsoft.com/office/drawing/2014/main" xmlns="" id="{E076C111-6E88-46C4-BCA8-9679A052DE3E}"/>
               </a:ext>
             </a:extLst>
           </p:cNvPr>
@@ -8160,7 +8237,7 @@
           <p:cNvPr id="3" name="Content Placeholder 2">
             <a:extLst>
               <a:ext uri="{FF2B5EF4-FFF2-40B4-BE49-F238E27FC236}">
-                <a16:creationId xmlns:a16="http://schemas.microsoft.com/office/drawing/2014/main" id="{76B6F5E8-79C7-41BD-A195-89A9EA8BB93C}"/>
+                <a16:creationId xmlns:a16="http://schemas.microsoft.com/office/drawing/2014/main" xmlns="" id="{76B6F5E8-79C7-41BD-A195-89A9EA8BB93C}"/>
               </a:ext>
             </a:extLst>
           </p:cNvPr>
@@ -8251,7 +8328,7 @@
           <p:cNvPr id="4" name="Text Placeholder 3">
             <a:extLst>
               <a:ext uri="{FF2B5EF4-FFF2-40B4-BE49-F238E27FC236}">
-                <a16:creationId xmlns:a16="http://schemas.microsoft.com/office/drawing/2014/main" id="{F319888A-3845-4731-B5D8-69810C76B13D}"/>
+                <a16:creationId xmlns:a16="http://schemas.microsoft.com/office/drawing/2014/main" xmlns="" id="{F319888A-3845-4731-B5D8-69810C76B13D}"/>
               </a:ext>
             </a:extLst>
           </p:cNvPr>
@@ -8322,7 +8399,7 @@
           <p:cNvPr id="5" name="Date Placeholder 4">
             <a:extLst>
               <a:ext uri="{FF2B5EF4-FFF2-40B4-BE49-F238E27FC236}">
-                <a16:creationId xmlns:a16="http://schemas.microsoft.com/office/drawing/2014/main" id="{1B2FFCA3-8C7A-49DB-9B73-8FC7A0BA9EEC}"/>
+                <a16:creationId xmlns:a16="http://schemas.microsoft.com/office/drawing/2014/main" xmlns="" id="{1B2FFCA3-8C7A-49DB-9B73-8FC7A0BA9EEC}"/>
               </a:ext>
             </a:extLst>
           </p:cNvPr>
@@ -8351,7 +8428,7 @@
           <p:cNvPr id="6" name="Footer Placeholder 5">
             <a:extLst>
               <a:ext uri="{FF2B5EF4-FFF2-40B4-BE49-F238E27FC236}">
-                <a16:creationId xmlns:a16="http://schemas.microsoft.com/office/drawing/2014/main" id="{268A088B-62F2-417E-B072-0B86CD37BA65}"/>
+                <a16:creationId xmlns:a16="http://schemas.microsoft.com/office/drawing/2014/main" xmlns="" id="{268A088B-62F2-417E-B072-0B86CD37BA65}"/>
               </a:ext>
             </a:extLst>
           </p:cNvPr>
@@ -8376,7 +8453,7 @@
           <p:cNvPr id="7" name="Slide Number Placeholder 6">
             <a:extLst>
               <a:ext uri="{FF2B5EF4-FFF2-40B4-BE49-F238E27FC236}">
-                <a16:creationId xmlns:a16="http://schemas.microsoft.com/office/drawing/2014/main" id="{924BCE8C-EBD4-467D-A095-92618183AC5D}"/>
+                <a16:creationId xmlns:a16="http://schemas.microsoft.com/office/drawing/2014/main" xmlns="" id="{924BCE8C-EBD4-467D-A095-92618183AC5D}"/>
               </a:ext>
             </a:extLst>
           </p:cNvPr>
@@ -8435,7 +8512,7 @@
           <p:cNvPr id="2" name="Title 1">
             <a:extLst>
               <a:ext uri="{FF2B5EF4-FFF2-40B4-BE49-F238E27FC236}">
-                <a16:creationId xmlns:a16="http://schemas.microsoft.com/office/drawing/2014/main" id="{FC53D4BF-51DA-4E8C-992E-1602B68F9F68}"/>
+                <a16:creationId xmlns:a16="http://schemas.microsoft.com/office/drawing/2014/main" xmlns="" id="{FC53D4BF-51DA-4E8C-992E-1602B68F9F68}"/>
               </a:ext>
             </a:extLst>
           </p:cNvPr>
@@ -8473,7 +8550,7 @@
           <p:cNvPr id="3" name="Picture Placeholder 2">
             <a:extLst>
               <a:ext uri="{FF2B5EF4-FFF2-40B4-BE49-F238E27FC236}">
-                <a16:creationId xmlns:a16="http://schemas.microsoft.com/office/drawing/2014/main" id="{67555624-C8CD-4E99-9554-EBF084BC40C0}"/>
+                <a16:creationId xmlns:a16="http://schemas.microsoft.com/office/drawing/2014/main" xmlns="" id="{67555624-C8CD-4E99-9554-EBF084BC40C0}"/>
               </a:ext>
             </a:extLst>
           </p:cNvPr>
@@ -8540,7 +8617,7 @@
           <p:cNvPr id="4" name="Text Placeholder 3">
             <a:extLst>
               <a:ext uri="{FF2B5EF4-FFF2-40B4-BE49-F238E27FC236}">
-                <a16:creationId xmlns:a16="http://schemas.microsoft.com/office/drawing/2014/main" id="{44BEB73F-D5EA-422A-A30A-352E9C290B5A}"/>
+                <a16:creationId xmlns:a16="http://schemas.microsoft.com/office/drawing/2014/main" xmlns="" id="{44BEB73F-D5EA-422A-A30A-352E9C290B5A}"/>
               </a:ext>
             </a:extLst>
           </p:cNvPr>
@@ -8611,7 +8688,7 @@
           <p:cNvPr id="5" name="Date Placeholder 4">
             <a:extLst>
               <a:ext uri="{FF2B5EF4-FFF2-40B4-BE49-F238E27FC236}">
-                <a16:creationId xmlns:a16="http://schemas.microsoft.com/office/drawing/2014/main" id="{4A99720D-015D-4232-9936-1B86431A94FD}"/>
+                <a16:creationId xmlns:a16="http://schemas.microsoft.com/office/drawing/2014/main" xmlns="" id="{4A99720D-015D-4232-9936-1B86431A94FD}"/>
               </a:ext>
             </a:extLst>
           </p:cNvPr>
@@ -8640,7 +8717,7 @@
           <p:cNvPr id="6" name="Footer Placeholder 5">
             <a:extLst>
               <a:ext uri="{FF2B5EF4-FFF2-40B4-BE49-F238E27FC236}">
-                <a16:creationId xmlns:a16="http://schemas.microsoft.com/office/drawing/2014/main" id="{9CDB918B-8361-42F8-A816-E9E8176AAF3A}"/>
+                <a16:creationId xmlns:a16="http://schemas.microsoft.com/office/drawing/2014/main" xmlns="" id="{9CDB918B-8361-42F8-A816-E9E8176AAF3A}"/>
               </a:ext>
             </a:extLst>
           </p:cNvPr>
@@ -8665,7 +8742,7 @@
           <p:cNvPr id="7" name="Slide Number Placeholder 6">
             <a:extLst>
               <a:ext uri="{FF2B5EF4-FFF2-40B4-BE49-F238E27FC236}">
-                <a16:creationId xmlns:a16="http://schemas.microsoft.com/office/drawing/2014/main" id="{C6EF8BC2-577A-467A-AB3A-837D20349895}"/>
+                <a16:creationId xmlns:a16="http://schemas.microsoft.com/office/drawing/2014/main" xmlns="" id="{C6EF8BC2-577A-467A-AB3A-837D20349895}"/>
               </a:ext>
             </a:extLst>
           </p:cNvPr>
@@ -8729,7 +8806,7 @@
           <p:cNvPr id="2" name="Title Placeholder 1">
             <a:extLst>
               <a:ext uri="{FF2B5EF4-FFF2-40B4-BE49-F238E27FC236}">
-                <a16:creationId xmlns:a16="http://schemas.microsoft.com/office/drawing/2014/main" id="{9BBA31EC-728C-42F2-B0F0-A961CEEF605D}"/>
+                <a16:creationId xmlns:a16="http://schemas.microsoft.com/office/drawing/2014/main" xmlns="" id="{9BBA31EC-728C-42F2-B0F0-A961CEEF605D}"/>
               </a:ext>
             </a:extLst>
           </p:cNvPr>
@@ -8768,7 +8845,7 @@
           <p:cNvPr id="3" name="Text Placeholder 2">
             <a:extLst>
               <a:ext uri="{FF2B5EF4-FFF2-40B4-BE49-F238E27FC236}">
-                <a16:creationId xmlns:a16="http://schemas.microsoft.com/office/drawing/2014/main" id="{F67301E8-A772-4838-AA88-21638F49A613}"/>
+                <a16:creationId xmlns:a16="http://schemas.microsoft.com/office/drawing/2014/main" xmlns="" id="{F67301E8-A772-4838-AA88-21638F49A613}"/>
               </a:ext>
             </a:extLst>
           </p:cNvPr>
@@ -8836,7 +8913,7 @@
           <p:cNvPr id="4" name="Date Placeholder 3">
             <a:extLst>
               <a:ext uri="{FF2B5EF4-FFF2-40B4-BE49-F238E27FC236}">
-                <a16:creationId xmlns:a16="http://schemas.microsoft.com/office/drawing/2014/main" id="{7CDA4740-A6AD-4B5B-B588-0521E7EF275A}"/>
+                <a16:creationId xmlns:a16="http://schemas.microsoft.com/office/drawing/2014/main" xmlns="" id="{7CDA4740-A6AD-4B5B-B588-0521E7EF275A}"/>
               </a:ext>
             </a:extLst>
           </p:cNvPr>
@@ -8883,7 +8960,7 @@
           <p:cNvPr id="5" name="Footer Placeholder 4">
             <a:extLst>
               <a:ext uri="{FF2B5EF4-FFF2-40B4-BE49-F238E27FC236}">
-                <a16:creationId xmlns:a16="http://schemas.microsoft.com/office/drawing/2014/main" id="{B64B1573-AAAA-4945-AD4E-A5B5D129C366}"/>
+                <a16:creationId xmlns:a16="http://schemas.microsoft.com/office/drawing/2014/main" xmlns="" id="{B64B1573-AAAA-4945-AD4E-A5B5D129C366}"/>
               </a:ext>
             </a:extLst>
           </p:cNvPr>
@@ -8926,7 +9003,7 @@
           <p:cNvPr id="6" name="Slide Number Placeholder 5">
             <a:extLst>
               <a:ext uri="{FF2B5EF4-FFF2-40B4-BE49-F238E27FC236}">
-                <a16:creationId xmlns:a16="http://schemas.microsoft.com/office/drawing/2014/main" id="{F1B1F6CD-EACB-4F39-A417-9C6A239414B0}"/>
+                <a16:creationId xmlns:a16="http://schemas.microsoft.com/office/drawing/2014/main" xmlns="" id="{F1B1F6CD-EACB-4F39-A417-9C6A239414B0}"/>
               </a:ext>
             </a:extLst>
           </p:cNvPr>
@@ -9302,7 +9379,7 @@
           <p:cNvPr id="2" name="Title 1">
             <a:extLst>
               <a:ext uri="{FF2B5EF4-FFF2-40B4-BE49-F238E27FC236}">
-                <a16:creationId xmlns:a16="http://schemas.microsoft.com/office/drawing/2014/main" id="{49373CA0-146F-45E9-93F4-8FDD368294CE}"/>
+                <a16:creationId xmlns:a16="http://schemas.microsoft.com/office/drawing/2014/main" xmlns="" id="{49373CA0-146F-45E9-93F4-8FDD368294CE}"/>
               </a:ext>
             </a:extLst>
           </p:cNvPr>
@@ -9362,7 +9439,7 @@
           <p:cNvPr id="3" name="Subtitle 2">
             <a:extLst>
               <a:ext uri="{FF2B5EF4-FFF2-40B4-BE49-F238E27FC236}">
-                <a16:creationId xmlns:a16="http://schemas.microsoft.com/office/drawing/2014/main" id="{AAFAF076-633B-47D5-8628-AFD6538FCAE9}"/>
+                <a16:creationId xmlns:a16="http://schemas.microsoft.com/office/drawing/2014/main" xmlns="" id="{AAFAF076-633B-47D5-8628-AFD6538FCAE9}"/>
               </a:ext>
             </a:extLst>
           </p:cNvPr>
@@ -9416,10 +9493,10 @@
           <p:cNvPr id="25" name="Rectangle 24">
             <a:extLst>
               <a:ext uri="{FF2B5EF4-FFF2-40B4-BE49-F238E27FC236}">
-                <a16:creationId xmlns:a16="http://schemas.microsoft.com/office/drawing/2014/main" id="{5C9DABB9-E0C0-430B-8E47-BDC0F4E110D5}"/>
+                <a16:creationId xmlns:a16="http://schemas.microsoft.com/office/drawing/2014/main" xmlns="" id="{5C9DABB9-E0C0-430B-8E47-BDC0F4E110D5}"/>
               </a:ext>
               <a:ext uri="{C183D7F6-B498-43B3-948B-1728B52AA6E4}">
-                <adec:decorative xmlns:adec="http://schemas.microsoft.com/office/drawing/2017/decorative" val="1"/>
+                <adec:decorative xmlns:adec="http://schemas.microsoft.com/office/drawing/2017/decorative" xmlns="" val="1"/>
               </a:ext>
             </a:extLst>
           </p:cNvPr>
@@ -9429,7 +9506,7 @@
           <p:nvPr>
             <p:extLst>
               <p:ext uri="{386F3935-93C4-4BCD-93E2-E3B085C9AB24}">
-                <p16:designElem xmlns:p16="http://schemas.microsoft.com/office/powerpoint/2015/main" val="1"/>
+                <p16:designElem xmlns:p16="http://schemas.microsoft.com/office/powerpoint/2015/main" xmlns="" val="1"/>
               </p:ext>
             </p:extLst>
           </p:nvPr>
@@ -9495,7 +9572,7 @@
           <p:cNvPr id="5" name="Picture 4" descr="A close up of a logo&#10;&#10;Description automatically generated">
             <a:extLst>
               <a:ext uri="{FF2B5EF4-FFF2-40B4-BE49-F238E27FC236}">
-                <a16:creationId xmlns:a16="http://schemas.microsoft.com/office/drawing/2014/main" id="{716A7481-19C1-49BA-840A-D14BE1B3252E}"/>
+                <a16:creationId xmlns:a16="http://schemas.microsoft.com/office/drawing/2014/main" xmlns="" id="{716A7481-19C1-49BA-840A-D14BE1B3252E}"/>
               </a:ext>
             </a:extLst>
           </p:cNvPr>
@@ -9536,6 +9613,13 @@
   <p:clrMapOvr>
     <a:masterClrMapping/>
   </p:clrMapOvr>
+  <p:timing>
+    <p:tnLst>
+      <p:par>
+        <p:cTn id="1" dur="indefinite" restart="never" nodeType="tmRoot"/>
+      </p:par>
+    </p:tnLst>
+  </p:timing>
 </p:sld>
 </file>
 
@@ -9569,7 +9653,7 @@
           <p:cNvPr id="2" name="Title 1">
             <a:extLst>
               <a:ext uri="{FF2B5EF4-FFF2-40B4-BE49-F238E27FC236}">
-                <a16:creationId xmlns:a16="http://schemas.microsoft.com/office/drawing/2014/main" id="{F37F33D8-89FE-48B8-A752-27F23E51A526}"/>
+                <a16:creationId xmlns:a16="http://schemas.microsoft.com/office/drawing/2014/main" xmlns="" id="{F37F33D8-89FE-48B8-A752-27F23E51A526}"/>
               </a:ext>
             </a:extLst>
           </p:cNvPr>
@@ -9605,7 +9689,7 @@
           <p:cNvPr id="3" name="Content Placeholder 2">
             <a:extLst>
               <a:ext uri="{FF2B5EF4-FFF2-40B4-BE49-F238E27FC236}">
-                <a16:creationId xmlns:a16="http://schemas.microsoft.com/office/drawing/2014/main" id="{98F4B88D-129A-478A-BFFB-ECD1D1B08F11}"/>
+                <a16:creationId xmlns:a16="http://schemas.microsoft.com/office/drawing/2014/main" xmlns="" id="{98F4B88D-129A-478A-BFFB-ECD1D1B08F11}"/>
               </a:ext>
             </a:extLst>
           </p:cNvPr>
@@ -9702,10 +9786,10 @@
           <p:cNvPr id="10" name="Oval 9">
             <a:extLst>
               <a:ext uri="{FF2B5EF4-FFF2-40B4-BE49-F238E27FC236}">
-                <a16:creationId xmlns:a16="http://schemas.microsoft.com/office/drawing/2014/main" id="{A7B99495-F43F-4D80-A44F-2CB4764EB90B}"/>
+                <a16:creationId xmlns:a16="http://schemas.microsoft.com/office/drawing/2014/main" xmlns="" id="{A7B99495-F43F-4D80-A44F-2CB4764EB90B}"/>
               </a:ext>
               <a:ext uri="{C183D7F6-B498-43B3-948B-1728B52AA6E4}">
-                <adec:decorative xmlns:adec="http://schemas.microsoft.com/office/drawing/2017/decorative" val="1"/>
+                <adec:decorative xmlns:adec="http://schemas.microsoft.com/office/drawing/2017/decorative" xmlns="" val="1"/>
               </a:ext>
             </a:extLst>
           </p:cNvPr>
@@ -9715,7 +9799,7 @@
           <p:nvPr>
             <p:extLst>
               <p:ext uri="{386F3935-93C4-4BCD-93E2-E3B085C9AB24}">
-                <p16:designElem xmlns:p16="http://schemas.microsoft.com/office/powerpoint/2015/main" val="1"/>
+                <p16:designElem xmlns:p16="http://schemas.microsoft.com/office/powerpoint/2015/main" xmlns="" val="1"/>
               </p:ext>
             </p:extLst>
           </p:nvPr>
@@ -9794,7 +9878,7 @@
           <p:cNvPr id="5" name="Picture 4" descr="A picture containing room, drawing&#10;&#10;Description automatically generated">
             <a:extLst>
               <a:ext uri="{FF2B5EF4-FFF2-40B4-BE49-F238E27FC236}">
-                <a16:creationId xmlns:a16="http://schemas.microsoft.com/office/drawing/2014/main" id="{EFF73C9E-1F96-46D4-9933-57FECB6C9622}"/>
+                <a16:creationId xmlns:a16="http://schemas.microsoft.com/office/drawing/2014/main" xmlns="" id="{EFF73C9E-1F96-46D4-9933-57FECB6C9622}"/>
               </a:ext>
             </a:extLst>
           </p:cNvPr>
@@ -9921,10 +10005,10 @@
           <p:cNvPr id="12" name="Arc 11">
             <a:extLst>
               <a:ext uri="{FF2B5EF4-FFF2-40B4-BE49-F238E27FC236}">
-                <a16:creationId xmlns:a16="http://schemas.microsoft.com/office/drawing/2014/main" id="{72DEF309-605D-4117-9340-6D589B6C3A34}"/>
+                <a16:creationId xmlns:a16="http://schemas.microsoft.com/office/drawing/2014/main" xmlns="" id="{72DEF309-605D-4117-9340-6D589B6C3A34}"/>
               </a:ext>
               <a:ext uri="{C183D7F6-B498-43B3-948B-1728B52AA6E4}">
-                <adec:decorative xmlns:adec="http://schemas.microsoft.com/office/drawing/2017/decorative" val="1"/>
+                <adec:decorative xmlns:adec="http://schemas.microsoft.com/office/drawing/2017/decorative" xmlns="" val="1"/>
               </a:ext>
             </a:extLst>
           </p:cNvPr>
@@ -9934,7 +10018,7 @@
           <p:nvPr>
             <p:extLst>
               <p:ext uri="{386F3935-93C4-4BCD-93E2-E3B085C9AB24}">
-                <p16:designElem xmlns:p16="http://schemas.microsoft.com/office/powerpoint/2015/main" val="1"/>
+                <p16:designElem xmlns:p16="http://schemas.microsoft.com/office/powerpoint/2015/main" xmlns="" val="1"/>
               </p:ext>
             </p:extLst>
           </p:nvPr>
@@ -9990,10 +10074,239 @@
   <p:clrMapOvr>
     <a:masterClrMapping/>
   </p:clrMapOvr>
+  <p:timing>
+    <p:tnLst>
+      <p:par>
+        <p:cTn id="1" dur="indefinite" restart="never" nodeType="tmRoot"/>
+      </p:par>
+    </p:tnLst>
+  </p:timing>
 </p:sld>
 </file>
 
 <file path=ppt/slides/slide11.xml><?xml version="1.0" encoding="utf-8"?>
+<p:sld xmlns:a="http://schemas.openxmlformats.org/drawingml/2006/main" xmlns:r="http://schemas.openxmlformats.org/officeDocument/2006/relationships" xmlns:p="http://schemas.openxmlformats.org/presentationml/2006/main">
+  <p:cSld>
+    <p:spTree>
+      <p:nvGrpSpPr>
+        <p:cNvPr id="1" name=""/>
+        <p:cNvGrpSpPr/>
+        <p:nvPr/>
+      </p:nvGrpSpPr>
+      <p:grpSpPr>
+        <a:xfrm>
+          <a:off x="0" y="0"/>
+          <a:ext cx="0" cy="0"/>
+          <a:chOff x="0" y="0"/>
+          <a:chExt cx="0" cy="0"/>
+        </a:xfrm>
+      </p:grpSpPr>
+      <p:pic>
+        <p:nvPicPr>
+          <p:cNvPr id="8" name="Content Placeholder 7"/>
+          <p:cNvPicPr>
+            <a:picLocks noGrp="1" noChangeAspect="1"/>
+          </p:cNvPicPr>
+          <p:nvPr>
+            <p:ph idx="1"/>
+          </p:nvPr>
+        </p:nvPicPr>
+        <p:blipFill>
+          <a:blip r:embed="rId2">
+            <a:extLst>
+              <a:ext uri="{28A0092B-C50C-407E-A947-70E740481C1C}">
+                <a14:useLocalDpi xmlns:a14="http://schemas.microsoft.com/office/drawing/2010/main" val="0"/>
+              </a:ext>
+            </a:extLst>
+          </a:blip>
+          <a:stretch>
+            <a:fillRect/>
+          </a:stretch>
+        </p:blipFill>
+        <p:spPr>
+          <a:xfrm>
+            <a:off x="679939" y="527540"/>
+            <a:ext cx="11019693" cy="6085985"/>
+          </a:xfrm>
+        </p:spPr>
+      </p:pic>
+      <p:pic>
+        <p:nvPicPr>
+          <p:cNvPr id="9" name="Picture 8"/>
+          <p:cNvPicPr>
+            <a:picLocks noChangeAspect="1"/>
+          </p:cNvPicPr>
+          <p:nvPr/>
+        </p:nvPicPr>
+        <p:blipFill>
+          <a:blip r:embed="rId3" cstate="print">
+            <a:extLst>
+              <a:ext uri="{28A0092B-C50C-407E-A947-70E740481C1C}">
+                <a14:useLocalDpi xmlns:a14="http://schemas.microsoft.com/office/drawing/2010/main" val="0"/>
+              </a:ext>
+            </a:extLst>
+          </a:blip>
+          <a:stretch>
+            <a:fillRect/>
+          </a:stretch>
+        </p:blipFill>
+        <p:spPr>
+          <a:xfrm>
+            <a:off x="10512302" y="4627685"/>
+            <a:ext cx="1081821" cy="643259"/>
+          </a:xfrm>
+          <a:prstGeom prst="rect">
+            <a:avLst/>
+          </a:prstGeom>
+        </p:spPr>
+      </p:pic>
+      <p:pic>
+        <p:nvPicPr>
+          <p:cNvPr id="10" name="Picture 9"/>
+          <p:cNvPicPr>
+            <a:picLocks noChangeAspect="1"/>
+          </p:cNvPicPr>
+          <p:nvPr/>
+        </p:nvPicPr>
+        <p:blipFill>
+          <a:blip r:embed="rId4" cstate="print">
+            <a:extLst>
+              <a:ext uri="{28A0092B-C50C-407E-A947-70E740481C1C}">
+                <a14:useLocalDpi xmlns:a14="http://schemas.microsoft.com/office/drawing/2010/main" val="0"/>
+              </a:ext>
+            </a:extLst>
+          </a:blip>
+          <a:stretch>
+            <a:fillRect/>
+          </a:stretch>
+        </p:blipFill>
+        <p:spPr>
+          <a:xfrm flipH="1">
+            <a:off x="6437921" y="3505200"/>
+            <a:ext cx="1094155" cy="820616"/>
+          </a:xfrm>
+          <a:prstGeom prst="rect">
+            <a:avLst/>
+          </a:prstGeom>
+        </p:spPr>
+      </p:pic>
+    </p:spTree>
+    <p:extLst>
+      <p:ext uri="{BB962C8B-B14F-4D97-AF65-F5344CB8AC3E}">
+        <p14:creationId xmlns:p14="http://schemas.microsoft.com/office/powerpoint/2010/main" val="1268017849"/>
+      </p:ext>
+    </p:extLst>
+  </p:cSld>
+  <p:clrMapOvr>
+    <a:masterClrMapping/>
+  </p:clrMapOvr>
+  <p:timing>
+    <p:tnLst>
+      <p:par>
+        <p:cTn id="1" dur="indefinite" restart="never" nodeType="tmRoot"/>
+      </p:par>
+    </p:tnLst>
+  </p:timing>
+</p:sld>
+</file>
+
+<file path=ppt/slides/slide12.xml><?xml version="1.0" encoding="utf-8"?>
+<p:sld xmlns:a="http://schemas.openxmlformats.org/drawingml/2006/main" xmlns:r="http://schemas.openxmlformats.org/officeDocument/2006/relationships" xmlns:p="http://schemas.openxmlformats.org/presentationml/2006/main">
+  <p:cSld>
+    <p:spTree>
+      <p:nvGrpSpPr>
+        <p:cNvPr id="1" name=""/>
+        <p:cNvGrpSpPr/>
+        <p:nvPr/>
+      </p:nvGrpSpPr>
+      <p:grpSpPr>
+        <a:xfrm>
+          <a:off x="0" y="0"/>
+          <a:ext cx="0" cy="0"/>
+          <a:chOff x="0" y="0"/>
+          <a:chExt cx="0" cy="0"/>
+        </a:xfrm>
+      </p:grpSpPr>
+      <p:pic>
+        <p:nvPicPr>
+          <p:cNvPr id="4" name="Content Placeholder 3"/>
+          <p:cNvPicPr>
+            <a:picLocks noGrp="1" noChangeAspect="1"/>
+          </p:cNvPicPr>
+          <p:nvPr>
+            <p:ph idx="1"/>
+          </p:nvPr>
+        </p:nvPicPr>
+        <p:blipFill>
+          <a:blip r:embed="rId2">
+            <a:extLst>
+              <a:ext uri="{28A0092B-C50C-407E-A947-70E740481C1C}">
+                <a14:useLocalDpi xmlns:a14="http://schemas.microsoft.com/office/drawing/2010/main" val="0"/>
+              </a:ext>
+            </a:extLst>
+          </a:blip>
+          <a:stretch>
+            <a:fillRect/>
+          </a:stretch>
+        </p:blipFill>
+        <p:spPr>
+          <a:xfrm>
+            <a:off x="5673970" y="304801"/>
+            <a:ext cx="5697415" cy="6154614"/>
+          </a:xfrm>
+        </p:spPr>
+      </p:pic>
+      <p:sp>
+        <p:nvSpPr>
+          <p:cNvPr id="5" name="TextBox 4"/>
+          <p:cNvSpPr txBox="1"/>
+          <p:nvPr/>
+        </p:nvSpPr>
+        <p:spPr>
+          <a:xfrm>
+            <a:off x="961292" y="2720388"/>
+            <a:ext cx="3505200" cy="1323439"/>
+          </a:xfrm>
+          <a:prstGeom prst="rect">
+            <a:avLst/>
+          </a:prstGeom>
+          <a:noFill/>
+        </p:spPr>
+        <p:txBody>
+          <a:bodyPr wrap="square" rtlCol="0">
+            <a:spAutoFit/>
+          </a:bodyPr>
+          <a:lstStyle/>
+          <a:p>
+            <a:r>
+              <a:rPr lang="en-US" sz="4000" b="1" dirty="0" smtClean="0"/>
+              <a:t>LEVEL 2 DFD OF OUR PROJECT</a:t>
+            </a:r>
+            <a:endParaRPr lang="en-IN" sz="4000" b="1" dirty="0"/>
+          </a:p>
+        </p:txBody>
+      </p:sp>
+    </p:spTree>
+    <p:extLst>
+      <p:ext uri="{BB962C8B-B14F-4D97-AF65-F5344CB8AC3E}">
+        <p14:creationId xmlns:p14="http://schemas.microsoft.com/office/powerpoint/2010/main" val="1018347533"/>
+      </p:ext>
+    </p:extLst>
+  </p:cSld>
+  <p:clrMapOvr>
+    <a:masterClrMapping/>
+  </p:clrMapOvr>
+  <p:timing>
+    <p:tnLst>
+      <p:par>
+        <p:cTn id="1" dur="indefinite" restart="never" nodeType="tmRoot"/>
+      </p:par>
+    </p:tnLst>
+  </p:timing>
+</p:sld>
+</file>
+
+<file path=ppt/slides/slide13.xml><?xml version="1.0" encoding="utf-8"?>
 <p:sld xmlns:a="http://schemas.openxmlformats.org/drawingml/2006/main" xmlns:r="http://schemas.openxmlformats.org/officeDocument/2006/relationships" xmlns:p="http://schemas.openxmlformats.org/presentationml/2006/main">
   <p:cSld>
     <p:bg>
@@ -10023,10 +10336,10 @@
           <p:cNvPr id="17" name="Rectangle 11">
             <a:extLst>
               <a:ext uri="{FF2B5EF4-FFF2-40B4-BE49-F238E27FC236}">
-                <a16:creationId xmlns:a16="http://schemas.microsoft.com/office/drawing/2014/main" id="{AFA67CD3-AB4E-4A7A-BEB8-53C445D8C44E}"/>
+                <a16:creationId xmlns:a16="http://schemas.microsoft.com/office/drawing/2014/main" xmlns="" id="{AFA67CD3-AB4E-4A7A-BEB8-53C445D8C44E}"/>
               </a:ext>
               <a:ext uri="{C183D7F6-B498-43B3-948B-1728B52AA6E4}">
-                <adec:decorative xmlns:adec="http://schemas.microsoft.com/office/drawing/2017/decorative" val="1"/>
+                <adec:decorative xmlns:adec="http://schemas.microsoft.com/office/drawing/2017/decorative" xmlns="" val="1"/>
               </a:ext>
             </a:extLst>
           </p:cNvPr>
@@ -10036,7 +10349,7 @@
           <p:nvPr>
             <p:extLst>
               <p:ext uri="{386F3935-93C4-4BCD-93E2-E3B085C9AB24}">
-                <p16:designElem xmlns:p16="http://schemas.microsoft.com/office/powerpoint/2015/main" val="1"/>
+                <p16:designElem xmlns:p16="http://schemas.microsoft.com/office/powerpoint/2015/main" xmlns="" val="1"/>
               </p:ext>
             </p:extLst>
           </p:nvPr>
@@ -10109,10 +10422,10 @@
           <p:cNvPr id="18" name="Picture 13">
             <a:extLst>
               <a:ext uri="{FF2B5EF4-FFF2-40B4-BE49-F238E27FC236}">
-                <a16:creationId xmlns:a16="http://schemas.microsoft.com/office/drawing/2014/main" id="{07CF545F-9C2E-4446-97CD-AD92990C2B68}"/>
+                <a16:creationId xmlns:a16="http://schemas.microsoft.com/office/drawing/2014/main" xmlns="" id="{07CF545F-9C2E-4446-97CD-AD92990C2B68}"/>
               </a:ext>
               <a:ext uri="{C183D7F6-B498-43B3-948B-1728B52AA6E4}">
-                <adec:decorative xmlns:adec="http://schemas.microsoft.com/office/drawing/2017/decorative" val="1"/>
+                <adec:decorative xmlns:adec="http://schemas.microsoft.com/office/drawing/2017/decorative" xmlns="" val="1"/>
               </a:ext>
             </a:extLst>
           </p:cNvPr>
@@ -10122,7 +10435,7 @@
           <p:nvPr>
             <p:extLst>
               <p:ext uri="{386F3935-93C4-4BCD-93E2-E3B085C9AB24}">
-                <p16:designElem xmlns:p16="http://schemas.microsoft.com/office/powerpoint/2015/main" val="1"/>
+                <p16:designElem xmlns:p16="http://schemas.microsoft.com/office/powerpoint/2015/main" xmlns="" val="1"/>
               </p:ext>
             </p:extLst>
           </p:nvPr>
@@ -10154,10 +10467,10 @@
           <p:cNvPr id="16" name="Freeform 62">
             <a:extLst>
               <a:ext uri="{FF2B5EF4-FFF2-40B4-BE49-F238E27FC236}">
-                <a16:creationId xmlns:a16="http://schemas.microsoft.com/office/drawing/2014/main" id="{339C8D78-A644-462F-B674-F440635E5353}"/>
+                <a16:creationId xmlns:a16="http://schemas.microsoft.com/office/drawing/2014/main" xmlns="" id="{339C8D78-A644-462F-B674-F440635E5353}"/>
               </a:ext>
               <a:ext uri="{C183D7F6-B498-43B3-948B-1728B52AA6E4}">
-                <adec:decorative xmlns:adec="http://schemas.microsoft.com/office/drawing/2017/decorative" val="1"/>
+                <adec:decorative xmlns:adec="http://schemas.microsoft.com/office/drawing/2017/decorative" xmlns="" val="1"/>
               </a:ext>
             </a:extLst>
           </p:cNvPr>
@@ -10167,7 +10480,7 @@
           <p:nvPr>
             <p:extLst>
               <p:ext uri="{386F3935-93C4-4BCD-93E2-E3B085C9AB24}">
-                <p16:designElem xmlns:p16="http://schemas.microsoft.com/office/powerpoint/2015/main" val="1"/>
+                <p16:designElem xmlns:p16="http://schemas.microsoft.com/office/powerpoint/2015/main" xmlns="" val="1"/>
               </p:ext>
             </p:extLst>
           </p:nvPr>
@@ -10328,7 +10641,7 @@
           <p:cNvPr id="7" name="Graphic 6" descr="Smiling Face with No Fill">
             <a:extLst>
               <a:ext uri="{FF2B5EF4-FFF2-40B4-BE49-F238E27FC236}">
-                <a16:creationId xmlns:a16="http://schemas.microsoft.com/office/drawing/2014/main" id="{A216C688-7E77-4DBA-800D-72645490D5CE}"/>
+                <a16:creationId xmlns:a16="http://schemas.microsoft.com/office/drawing/2014/main" xmlns="" id="{A216C688-7E77-4DBA-800D-72645490D5CE}"/>
               </a:ext>
             </a:extLst>
           </p:cNvPr>
@@ -10344,7 +10657,7 @@
                 <a14:useLocalDpi xmlns:a14="http://schemas.microsoft.com/office/drawing/2010/main" val="0"/>
               </a:ext>
               <a:ext uri="{96DAC541-7B7A-43D3-8B79-37D633B846F1}">
-                <asvg:svgBlip xmlns:asvg="http://schemas.microsoft.com/office/drawing/2016/SVG/main" r:embed="rId4"/>
+                <asvg:svgBlip xmlns:asvg="http://schemas.microsoft.com/office/drawing/2016/SVG/main" xmlns="" r:embed="rId4"/>
               </a:ext>
             </a:extLst>
           </a:blip>
@@ -10367,7 +10680,7 @@
           <p:cNvPr id="4" name="TextBox 3">
             <a:extLst>
               <a:ext uri="{FF2B5EF4-FFF2-40B4-BE49-F238E27FC236}">
-                <a16:creationId xmlns:a16="http://schemas.microsoft.com/office/drawing/2014/main" id="{9B54BB5C-C24B-4829-B86B-89082A13575A}"/>
+                <a16:creationId xmlns:a16="http://schemas.microsoft.com/office/drawing/2014/main" xmlns="" id="{9B54BB5C-C24B-4829-B86B-89082A13575A}"/>
               </a:ext>
             </a:extLst>
           </p:cNvPr>
@@ -10416,6 +10729,13 @@
   <p:clrMapOvr>
     <a:masterClrMapping/>
   </p:clrMapOvr>
+  <p:timing>
+    <p:tnLst>
+      <p:par>
+        <p:cTn id="1" dur="indefinite" restart="never" nodeType="tmRoot"/>
+      </p:par>
+    </p:tnLst>
+  </p:timing>
 </p:sld>
 </file>
 
@@ -10449,10 +10769,10 @@
           <p:cNvPr id="8" name="Rectangle 7">
             <a:extLst>
               <a:ext uri="{FF2B5EF4-FFF2-40B4-BE49-F238E27FC236}">
-                <a16:creationId xmlns:a16="http://schemas.microsoft.com/office/drawing/2014/main" id="{8D70B121-56F4-4848-B38B-182089D909FA}"/>
+                <a16:creationId xmlns:a16="http://schemas.microsoft.com/office/drawing/2014/main" xmlns="" id="{8D70B121-56F4-4848-B38B-182089D909FA}"/>
               </a:ext>
               <a:ext uri="{C183D7F6-B498-43B3-948B-1728B52AA6E4}">
-                <adec:decorative xmlns:adec="http://schemas.microsoft.com/office/drawing/2017/decorative" val="1"/>
+                <adec:decorative xmlns:adec="http://schemas.microsoft.com/office/drawing/2017/decorative" xmlns="" val="1"/>
               </a:ext>
             </a:extLst>
           </p:cNvPr>
@@ -10462,7 +10782,7 @@
           <p:nvPr>
             <p:extLst>
               <p:ext uri="{386F3935-93C4-4BCD-93E2-E3B085C9AB24}">
-                <p16:designElem xmlns:p16="http://schemas.microsoft.com/office/powerpoint/2015/main" val="1"/>
+                <p16:designElem xmlns:p16="http://schemas.microsoft.com/office/powerpoint/2015/main" xmlns="" val="1"/>
               </p:ext>
             </p:extLst>
           </p:nvPr>
@@ -10514,7 +10834,7 @@
           <p:cNvPr id="2" name="Title 1">
             <a:extLst>
               <a:ext uri="{FF2B5EF4-FFF2-40B4-BE49-F238E27FC236}">
-                <a16:creationId xmlns:a16="http://schemas.microsoft.com/office/drawing/2014/main" id="{E75B026C-E5B5-4371-90FE-F3F92B8E788E}"/>
+                <a16:creationId xmlns:a16="http://schemas.microsoft.com/office/drawing/2014/main" xmlns="" id="{E75B026C-E5B5-4371-90FE-F3F92B8E788E}"/>
               </a:ext>
             </a:extLst>
           </p:cNvPr>
@@ -10559,10 +10879,10 @@
           <p:cNvPr id="10" name="Straight Connector 9">
             <a:extLst>
               <a:ext uri="{FF2B5EF4-FFF2-40B4-BE49-F238E27FC236}">
-                <a16:creationId xmlns:a16="http://schemas.microsoft.com/office/drawing/2014/main" id="{2D72A2C9-F3CA-4216-8BAD-FA4C970C3C4E}"/>
+                <a16:creationId xmlns:a16="http://schemas.microsoft.com/office/drawing/2014/main" xmlns="" id="{2D72A2C9-F3CA-4216-8BAD-FA4C970C3C4E}"/>
               </a:ext>
               <a:ext uri="{C183D7F6-B498-43B3-948B-1728B52AA6E4}">
-                <adec:decorative xmlns:adec="http://schemas.microsoft.com/office/drawing/2017/decorative" val="1"/>
+                <adec:decorative xmlns:adec="http://schemas.microsoft.com/office/drawing/2017/decorative" xmlns="" val="1"/>
               </a:ext>
             </a:extLst>
           </p:cNvPr>
@@ -10572,7 +10892,7 @@
           <p:nvPr>
             <p:extLst>
               <p:ext uri="{386F3935-93C4-4BCD-93E2-E3B085C9AB24}">
-                <p16:designElem xmlns:p16="http://schemas.microsoft.com/office/powerpoint/2015/main" val="1"/>
+                <p16:designElem xmlns:p16="http://schemas.microsoft.com/office/powerpoint/2015/main" xmlns="" val="1"/>
               </p:ext>
             </p:extLst>
           </p:nvPr>
@@ -10614,7 +10934,7 @@
           <p:cNvPr id="3" name="Content Placeholder 2">
             <a:extLst>
               <a:ext uri="{FF2B5EF4-FFF2-40B4-BE49-F238E27FC236}">
-                <a16:creationId xmlns:a16="http://schemas.microsoft.com/office/drawing/2014/main" id="{C527B620-3F39-45A0-934E-D0E3DDC76AB8}"/>
+                <a16:creationId xmlns:a16="http://schemas.microsoft.com/office/drawing/2014/main" xmlns="" id="{C527B620-3F39-45A0-934E-D0E3DDC76AB8}"/>
               </a:ext>
             </a:extLst>
           </p:cNvPr>
@@ -10675,6 +10995,13 @@
   <p:clrMapOvr>
     <a:masterClrMapping/>
   </p:clrMapOvr>
+  <p:timing>
+    <p:tnLst>
+      <p:par>
+        <p:cTn id="1" dur="indefinite" restart="never" nodeType="tmRoot"/>
+      </p:par>
+    </p:tnLst>
+  </p:timing>
 </p:sld>
 </file>
 
@@ -10708,7 +11035,7 @@
           <p:cNvPr id="2" name="Title 1">
             <a:extLst>
               <a:ext uri="{FF2B5EF4-FFF2-40B4-BE49-F238E27FC236}">
-                <a16:creationId xmlns:a16="http://schemas.microsoft.com/office/drawing/2014/main" id="{20E82C7F-FCFD-44AD-9401-EA333615BC66}"/>
+                <a16:creationId xmlns:a16="http://schemas.microsoft.com/office/drawing/2014/main" xmlns="" id="{20E82C7F-FCFD-44AD-9401-EA333615BC66}"/>
               </a:ext>
             </a:extLst>
           </p:cNvPr>
@@ -10744,7 +11071,7 @@
           <p:cNvPr id="5" name="Content Placeholder 2">
             <a:extLst>
               <a:ext uri="{FF2B5EF4-FFF2-40B4-BE49-F238E27FC236}">
-                <a16:creationId xmlns:a16="http://schemas.microsoft.com/office/drawing/2014/main" id="{3D829D9C-59EC-46FE-8AB4-3E28D4D0D51A}"/>
+                <a16:creationId xmlns:a16="http://schemas.microsoft.com/office/drawing/2014/main" xmlns="" id="{3D829D9C-59EC-46FE-8AB4-3E28D4D0D51A}"/>
               </a:ext>
             </a:extLst>
           </p:cNvPr>
@@ -10780,6 +11107,13 @@
   <p:clrMapOvr>
     <a:masterClrMapping/>
   </p:clrMapOvr>
+  <p:timing>
+    <p:tnLst>
+      <p:par>
+        <p:cTn id="1" dur="indefinite" restart="never" nodeType="tmRoot"/>
+      </p:par>
+    </p:tnLst>
+  </p:timing>
 </p:sld>
 </file>
 
@@ -10813,7 +11147,7 @@
           <p:cNvPr id="2" name="Title 1">
             <a:extLst>
               <a:ext uri="{FF2B5EF4-FFF2-40B4-BE49-F238E27FC236}">
-                <a16:creationId xmlns:a16="http://schemas.microsoft.com/office/drawing/2014/main" id="{18E45647-341A-404B-AC53-1A93C1636F8D}"/>
+                <a16:creationId xmlns:a16="http://schemas.microsoft.com/office/drawing/2014/main" xmlns="" id="{18E45647-341A-404B-AC53-1A93C1636F8D}"/>
               </a:ext>
             </a:extLst>
           </p:cNvPr>
@@ -10849,7 +11183,7 @@
           <p:cNvPr id="6" name="Content Placeholder 2">
             <a:extLst>
               <a:ext uri="{FF2B5EF4-FFF2-40B4-BE49-F238E27FC236}">
-                <a16:creationId xmlns:a16="http://schemas.microsoft.com/office/drawing/2014/main" id="{59572F5F-2059-44B6-A9D7-29764BB50821}"/>
+                <a16:creationId xmlns:a16="http://schemas.microsoft.com/office/drawing/2014/main" xmlns="" id="{59572F5F-2059-44B6-A9D7-29764BB50821}"/>
               </a:ext>
             </a:extLst>
           </p:cNvPr>
@@ -10885,6 +11219,13 @@
   <p:clrMapOvr>
     <a:masterClrMapping/>
   </p:clrMapOvr>
+  <p:timing>
+    <p:tnLst>
+      <p:par>
+        <p:cTn id="1" dur="indefinite" restart="never" nodeType="tmRoot"/>
+      </p:par>
+    </p:tnLst>
+  </p:timing>
 </p:sld>
 </file>
 
@@ -10918,10 +11259,10 @@
           <p:cNvPr id="8" name="Rectangle 7">
             <a:extLst>
               <a:ext uri="{FF2B5EF4-FFF2-40B4-BE49-F238E27FC236}">
-                <a16:creationId xmlns:a16="http://schemas.microsoft.com/office/drawing/2014/main" id="{8D70B121-56F4-4848-B38B-182089D909FA}"/>
+                <a16:creationId xmlns:a16="http://schemas.microsoft.com/office/drawing/2014/main" xmlns="" id="{8D70B121-56F4-4848-B38B-182089D909FA}"/>
               </a:ext>
               <a:ext uri="{C183D7F6-B498-43B3-948B-1728B52AA6E4}">
-                <adec:decorative xmlns:adec="http://schemas.microsoft.com/office/drawing/2017/decorative" val="1"/>
+                <adec:decorative xmlns:adec="http://schemas.microsoft.com/office/drawing/2017/decorative" xmlns="" val="1"/>
               </a:ext>
             </a:extLst>
           </p:cNvPr>
@@ -10931,7 +11272,7 @@
           <p:nvPr>
             <p:extLst>
               <p:ext uri="{386F3935-93C4-4BCD-93E2-E3B085C9AB24}">
-                <p16:designElem xmlns:p16="http://schemas.microsoft.com/office/powerpoint/2015/main" val="1"/>
+                <p16:designElem xmlns:p16="http://schemas.microsoft.com/office/powerpoint/2015/main" xmlns="" val="1"/>
               </p:ext>
             </p:extLst>
           </p:nvPr>
@@ -10983,7 +11324,7 @@
           <p:cNvPr id="2" name="Title 1">
             <a:extLst>
               <a:ext uri="{FF2B5EF4-FFF2-40B4-BE49-F238E27FC236}">
-                <a16:creationId xmlns:a16="http://schemas.microsoft.com/office/drawing/2014/main" id="{32E31B5E-BECB-4B53-9A66-8C446DB1A1F8}"/>
+                <a16:creationId xmlns:a16="http://schemas.microsoft.com/office/drawing/2014/main" xmlns="" id="{32E31B5E-BECB-4B53-9A66-8C446DB1A1F8}"/>
               </a:ext>
             </a:extLst>
           </p:cNvPr>
@@ -11028,10 +11369,10 @@
           <p:cNvPr id="10" name="Straight Connector 9">
             <a:extLst>
               <a:ext uri="{FF2B5EF4-FFF2-40B4-BE49-F238E27FC236}">
-                <a16:creationId xmlns:a16="http://schemas.microsoft.com/office/drawing/2014/main" id="{2D72A2C9-F3CA-4216-8BAD-FA4C970C3C4E}"/>
+                <a16:creationId xmlns:a16="http://schemas.microsoft.com/office/drawing/2014/main" xmlns="" id="{2D72A2C9-F3CA-4216-8BAD-FA4C970C3C4E}"/>
               </a:ext>
               <a:ext uri="{C183D7F6-B498-43B3-948B-1728B52AA6E4}">
-                <adec:decorative xmlns:adec="http://schemas.microsoft.com/office/drawing/2017/decorative" val="1"/>
+                <adec:decorative xmlns:adec="http://schemas.microsoft.com/office/drawing/2017/decorative" xmlns="" val="1"/>
               </a:ext>
             </a:extLst>
           </p:cNvPr>
@@ -11041,7 +11382,7 @@
           <p:nvPr>
             <p:extLst>
               <p:ext uri="{386F3935-93C4-4BCD-93E2-E3B085C9AB24}">
-                <p16:designElem xmlns:p16="http://schemas.microsoft.com/office/powerpoint/2015/main" val="1"/>
+                <p16:designElem xmlns:p16="http://schemas.microsoft.com/office/powerpoint/2015/main" xmlns="" val="1"/>
               </p:ext>
             </p:extLst>
           </p:nvPr>
@@ -11083,7 +11424,7 @@
           <p:cNvPr id="3" name="Content Placeholder 2">
             <a:extLst>
               <a:ext uri="{FF2B5EF4-FFF2-40B4-BE49-F238E27FC236}">
-                <a16:creationId xmlns:a16="http://schemas.microsoft.com/office/drawing/2014/main" id="{435E3FFD-5E26-4389-A8C8-E2FAA0B3EDDA}"/>
+                <a16:creationId xmlns:a16="http://schemas.microsoft.com/office/drawing/2014/main" xmlns="" id="{435E3FFD-5E26-4389-A8C8-E2FAA0B3EDDA}"/>
               </a:ext>
             </a:extLst>
           </p:cNvPr>
@@ -11163,6 +11504,13 @@
   <p:clrMapOvr>
     <a:masterClrMapping/>
   </p:clrMapOvr>
+  <p:timing>
+    <p:tnLst>
+      <p:par>
+        <p:cTn id="1" dur="indefinite" restart="never" nodeType="tmRoot"/>
+      </p:par>
+    </p:tnLst>
+  </p:timing>
 </p:sld>
 </file>
 
@@ -11196,10 +11544,10 @@
           <p:cNvPr id="8" name="Rectangle 7">
             <a:extLst>
               <a:ext uri="{FF2B5EF4-FFF2-40B4-BE49-F238E27FC236}">
-                <a16:creationId xmlns:a16="http://schemas.microsoft.com/office/drawing/2014/main" id="{4038CB10-1F5C-4D54-9DF7-12586DE5B007}"/>
+                <a16:creationId xmlns:a16="http://schemas.microsoft.com/office/drawing/2014/main" xmlns="" id="{4038CB10-1F5C-4D54-9DF7-12586DE5B007}"/>
               </a:ext>
               <a:ext uri="{C183D7F6-B498-43B3-948B-1728B52AA6E4}">
-                <adec:decorative xmlns:adec="http://schemas.microsoft.com/office/drawing/2017/decorative" val="1"/>
+                <adec:decorative xmlns:adec="http://schemas.microsoft.com/office/drawing/2017/decorative" xmlns="" val="1"/>
               </a:ext>
             </a:extLst>
           </p:cNvPr>
@@ -11209,7 +11557,7 @@
           <p:nvPr>
             <p:extLst>
               <p:ext uri="{386F3935-93C4-4BCD-93E2-E3B085C9AB24}">
-                <p16:designElem xmlns:p16="http://schemas.microsoft.com/office/powerpoint/2015/main" val="1"/>
+                <p16:designElem xmlns:p16="http://schemas.microsoft.com/office/powerpoint/2015/main" xmlns="" val="1"/>
               </p:ext>
             </p:extLst>
           </p:nvPr>
@@ -11290,7 +11638,7 @@
           <p:cNvPr id="2" name="Title 1">
             <a:extLst>
               <a:ext uri="{FF2B5EF4-FFF2-40B4-BE49-F238E27FC236}">
-                <a16:creationId xmlns:a16="http://schemas.microsoft.com/office/drawing/2014/main" id="{2603FFBF-50F1-4E77-94D1-DB0B695E8F1E}"/>
+                <a16:creationId xmlns:a16="http://schemas.microsoft.com/office/drawing/2014/main" xmlns="" id="{2603FFBF-50F1-4E77-94D1-DB0B695E8F1E}"/>
               </a:ext>
             </a:extLst>
           </p:cNvPr>
@@ -11334,10 +11682,10 @@
           <p:cNvPr id="10" name="Rectangle 9">
             <a:extLst>
               <a:ext uri="{FF2B5EF4-FFF2-40B4-BE49-F238E27FC236}">
-                <a16:creationId xmlns:a16="http://schemas.microsoft.com/office/drawing/2014/main" id="{73ED6512-6858-4552-B699-9A97FE9A4EA2}"/>
+                <a16:creationId xmlns:a16="http://schemas.microsoft.com/office/drawing/2014/main" xmlns="" id="{73ED6512-6858-4552-B699-9A97FE9A4EA2}"/>
               </a:ext>
               <a:ext uri="{C183D7F6-B498-43B3-948B-1728B52AA6E4}">
-                <adec:decorative xmlns:adec="http://schemas.microsoft.com/office/drawing/2017/decorative" val="1"/>
+                <adec:decorative xmlns:adec="http://schemas.microsoft.com/office/drawing/2017/decorative" xmlns="" val="1"/>
               </a:ext>
             </a:extLst>
           </p:cNvPr>
@@ -11347,7 +11695,7 @@
           <p:nvPr>
             <p:extLst>
               <p:ext uri="{386F3935-93C4-4BCD-93E2-E3B085C9AB24}">
-                <p16:designElem xmlns:p16="http://schemas.microsoft.com/office/powerpoint/2015/main" val="1"/>
+                <p16:designElem xmlns:p16="http://schemas.microsoft.com/office/powerpoint/2015/main" xmlns="" val="1"/>
               </p:ext>
             </p:extLst>
           </p:nvPr>
@@ -11426,7 +11774,7 @@
           <p:cNvPr id="3" name="Content Placeholder 2">
             <a:extLst>
               <a:ext uri="{FF2B5EF4-FFF2-40B4-BE49-F238E27FC236}">
-                <a16:creationId xmlns:a16="http://schemas.microsoft.com/office/drawing/2014/main" id="{C15491CE-FD41-4D59-B078-8A8F9921C9C9}"/>
+                <a16:creationId xmlns:a16="http://schemas.microsoft.com/office/drawing/2014/main" xmlns="" id="{C15491CE-FD41-4D59-B078-8A8F9921C9C9}"/>
               </a:ext>
             </a:extLst>
           </p:cNvPr>
@@ -11537,6 +11885,13 @@
   <p:clrMapOvr>
     <a:masterClrMapping/>
   </p:clrMapOvr>
+  <p:timing>
+    <p:tnLst>
+      <p:par>
+        <p:cTn id="1" dur="indefinite" restart="never" nodeType="tmRoot"/>
+      </p:par>
+    </p:tnLst>
+  </p:timing>
 </p:sld>
 </file>
 
@@ -11570,7 +11925,7 @@
           <p:cNvPr id="2" name="Title 1">
             <a:extLst>
               <a:ext uri="{FF2B5EF4-FFF2-40B4-BE49-F238E27FC236}">
-                <a16:creationId xmlns:a16="http://schemas.microsoft.com/office/drawing/2014/main" id="{BB753ACB-DA7A-4751-BB2B-323FB7CAB82A}"/>
+                <a16:creationId xmlns:a16="http://schemas.microsoft.com/office/drawing/2014/main" xmlns="" id="{BB753ACB-DA7A-4751-BB2B-323FB7CAB82A}"/>
               </a:ext>
             </a:extLst>
           </p:cNvPr>
@@ -11606,10 +11961,10 @@
           <p:cNvPr id="8" name="Freeform: Shape 7">
             <a:extLst>
               <a:ext uri="{FF2B5EF4-FFF2-40B4-BE49-F238E27FC236}">
-                <a16:creationId xmlns:a16="http://schemas.microsoft.com/office/drawing/2014/main" id="{8BB56887-D0D5-4F0C-9E19-7247EB83C8B7}"/>
+                <a16:creationId xmlns:a16="http://schemas.microsoft.com/office/drawing/2014/main" xmlns="" id="{8BB56887-D0D5-4F0C-9E19-7247EB83C8B7}"/>
               </a:ext>
               <a:ext uri="{C183D7F6-B498-43B3-948B-1728B52AA6E4}">
-                <adec:decorative xmlns:adec="http://schemas.microsoft.com/office/drawing/2017/decorative" val="1"/>
+                <adec:decorative xmlns:adec="http://schemas.microsoft.com/office/drawing/2017/decorative" xmlns="" val="1"/>
               </a:ext>
             </a:extLst>
           </p:cNvPr>
@@ -11619,7 +11974,7 @@
           <p:nvPr>
             <p:extLst>
               <p:ext uri="{386F3935-93C4-4BCD-93E2-E3B085C9AB24}">
-                <p16:designElem xmlns:p16="http://schemas.microsoft.com/office/powerpoint/2015/main" val="1"/>
+                <p16:designElem xmlns:p16="http://schemas.microsoft.com/office/powerpoint/2015/main" xmlns="" val="1"/>
               </p:ext>
             </p:extLst>
           </p:nvPr>
@@ -11726,7 +12081,7 @@
           <p:cNvPr id="12" name="Content Placeholder 2">
             <a:extLst>
               <a:ext uri="{FF2B5EF4-FFF2-40B4-BE49-F238E27FC236}">
-                <a16:creationId xmlns:a16="http://schemas.microsoft.com/office/drawing/2014/main" id="{3AB43DC3-9FC6-439F-8D6F-B9E49563F827}"/>
+                <a16:creationId xmlns:a16="http://schemas.microsoft.com/office/drawing/2014/main" xmlns="" id="{3AB43DC3-9FC6-439F-8D6F-B9E49563F827}"/>
               </a:ext>
             </a:extLst>
           </p:cNvPr>
@@ -11792,10 +12147,10 @@
           <p:cNvPr id="13" name="Arc 9">
             <a:extLst>
               <a:ext uri="{FF2B5EF4-FFF2-40B4-BE49-F238E27FC236}">
-                <a16:creationId xmlns:a16="http://schemas.microsoft.com/office/drawing/2014/main" id="{081E4A58-353D-44AE-B2FC-2A74E2E400F7}"/>
+                <a16:creationId xmlns:a16="http://schemas.microsoft.com/office/drawing/2014/main" xmlns="" id="{081E4A58-353D-44AE-B2FC-2A74E2E400F7}"/>
               </a:ext>
               <a:ext uri="{C183D7F6-B498-43B3-948B-1728B52AA6E4}">
-                <adec:decorative xmlns:adec="http://schemas.microsoft.com/office/drawing/2017/decorative" val="1"/>
+                <adec:decorative xmlns:adec="http://schemas.microsoft.com/office/drawing/2017/decorative" xmlns="" val="1"/>
               </a:ext>
             </a:extLst>
           </p:cNvPr>
@@ -11805,7 +12160,7 @@
           <p:nvPr>
             <p:extLst>
               <p:ext uri="{386F3935-93C4-4BCD-93E2-E3B085C9AB24}">
-                <p16:designElem xmlns:p16="http://schemas.microsoft.com/office/powerpoint/2015/main" val="1"/>
+                <p16:designElem xmlns:p16="http://schemas.microsoft.com/office/powerpoint/2015/main" xmlns="" val="1"/>
               </p:ext>
             </p:extLst>
           </p:nvPr>
@@ -11853,7 +12208,7 @@
           <p:cNvPr id="6" name="Picture 5" descr="A close up of a logo&#10;&#10;Description automatically generated">
             <a:extLst>
               <a:ext uri="{FF2B5EF4-FFF2-40B4-BE49-F238E27FC236}">
-                <a16:creationId xmlns:a16="http://schemas.microsoft.com/office/drawing/2014/main" id="{D1A3627D-35A9-4951-A3A0-0EB38FA4D0FE}"/>
+                <a16:creationId xmlns:a16="http://schemas.microsoft.com/office/drawing/2014/main" xmlns="" id="{D1A3627D-35A9-4951-A3A0-0EB38FA4D0FE}"/>
               </a:ext>
             </a:extLst>
           </p:cNvPr>
@@ -11894,6 +12249,13 @@
   <p:clrMapOvr>
     <a:masterClrMapping/>
   </p:clrMapOvr>
+  <p:timing>
+    <p:tnLst>
+      <p:par>
+        <p:cTn id="1" dur="indefinite" restart="never" nodeType="tmRoot"/>
+      </p:par>
+    </p:tnLst>
+  </p:timing>
 </p:sld>
 </file>
 
@@ -11927,7 +12289,7 @@
           <p:cNvPr id="2" name="Title 1">
             <a:extLst>
               <a:ext uri="{FF2B5EF4-FFF2-40B4-BE49-F238E27FC236}">
-                <a16:creationId xmlns:a16="http://schemas.microsoft.com/office/drawing/2014/main" id="{561E00A7-BED2-447E-8181-627427C61548}"/>
+                <a16:creationId xmlns:a16="http://schemas.microsoft.com/office/drawing/2014/main" xmlns="" id="{561E00A7-BED2-447E-8181-627427C61548}"/>
               </a:ext>
             </a:extLst>
           </p:cNvPr>
@@ -11963,10 +12325,10 @@
           <p:cNvPr id="8" name="Freeform: Shape 7">
             <a:extLst>
               <a:ext uri="{FF2B5EF4-FFF2-40B4-BE49-F238E27FC236}">
-                <a16:creationId xmlns:a16="http://schemas.microsoft.com/office/drawing/2014/main" id="{8BB56887-D0D5-4F0C-9E19-7247EB83C8B7}"/>
+                <a16:creationId xmlns:a16="http://schemas.microsoft.com/office/drawing/2014/main" xmlns="" id="{8BB56887-D0D5-4F0C-9E19-7247EB83C8B7}"/>
               </a:ext>
               <a:ext uri="{C183D7F6-B498-43B3-948B-1728B52AA6E4}">
-                <adec:decorative xmlns:adec="http://schemas.microsoft.com/office/drawing/2017/decorative" val="1"/>
+                <adec:decorative xmlns:adec="http://schemas.microsoft.com/office/drawing/2017/decorative" xmlns="" val="1"/>
               </a:ext>
             </a:extLst>
           </p:cNvPr>
@@ -11976,7 +12338,7 @@
           <p:nvPr>
             <p:extLst>
               <p:ext uri="{386F3935-93C4-4BCD-93E2-E3B085C9AB24}">
-                <p16:designElem xmlns:p16="http://schemas.microsoft.com/office/powerpoint/2015/main" val="1"/>
+                <p16:designElem xmlns:p16="http://schemas.microsoft.com/office/powerpoint/2015/main" xmlns="" val="1"/>
               </p:ext>
             </p:extLst>
           </p:nvPr>
@@ -12083,7 +12445,7 @@
           <p:cNvPr id="3" name="Content Placeholder 2">
             <a:extLst>
               <a:ext uri="{FF2B5EF4-FFF2-40B4-BE49-F238E27FC236}">
-                <a16:creationId xmlns:a16="http://schemas.microsoft.com/office/drawing/2014/main" id="{1F9BA9F7-46B0-4346-96D1-A405AB19ECF2}"/>
+                <a16:creationId xmlns:a16="http://schemas.microsoft.com/office/drawing/2014/main" xmlns="" id="{1F9BA9F7-46B0-4346-96D1-A405AB19ECF2}"/>
               </a:ext>
             </a:extLst>
           </p:cNvPr>
@@ -12164,10 +12526,10 @@
           <p:cNvPr id="16" name="Arc 9">
             <a:extLst>
               <a:ext uri="{FF2B5EF4-FFF2-40B4-BE49-F238E27FC236}">
-                <a16:creationId xmlns:a16="http://schemas.microsoft.com/office/drawing/2014/main" id="{081E4A58-353D-44AE-B2FC-2A74E2E400F7}"/>
+                <a16:creationId xmlns:a16="http://schemas.microsoft.com/office/drawing/2014/main" xmlns="" id="{081E4A58-353D-44AE-B2FC-2A74E2E400F7}"/>
               </a:ext>
               <a:ext uri="{C183D7F6-B498-43B3-948B-1728B52AA6E4}">
-                <adec:decorative xmlns:adec="http://schemas.microsoft.com/office/drawing/2017/decorative" val="1"/>
+                <adec:decorative xmlns:adec="http://schemas.microsoft.com/office/drawing/2017/decorative" xmlns="" val="1"/>
               </a:ext>
             </a:extLst>
           </p:cNvPr>
@@ -12177,7 +12539,7 @@
           <p:nvPr>
             <p:extLst>
               <p:ext uri="{386F3935-93C4-4BCD-93E2-E3B085C9AB24}">
-                <p16:designElem xmlns:p16="http://schemas.microsoft.com/office/powerpoint/2015/main" val="1"/>
+                <p16:designElem xmlns:p16="http://schemas.microsoft.com/office/powerpoint/2015/main" xmlns="" val="1"/>
               </p:ext>
             </p:extLst>
           </p:nvPr>
@@ -12225,7 +12587,7 @@
           <p:cNvPr id="29" name="Picture 28" descr="A close up of a logo&#10;&#10;Description automatically generated">
             <a:extLst>
               <a:ext uri="{FF2B5EF4-FFF2-40B4-BE49-F238E27FC236}">
-                <a16:creationId xmlns:a16="http://schemas.microsoft.com/office/drawing/2014/main" id="{92B7E278-DD9B-4AC0-8805-9E408F38AD0F}"/>
+                <a16:creationId xmlns:a16="http://schemas.microsoft.com/office/drawing/2014/main" xmlns="" id="{92B7E278-DD9B-4AC0-8805-9E408F38AD0F}"/>
               </a:ext>
             </a:extLst>
           </p:cNvPr>
@@ -12266,6 +12628,13 @@
   <p:clrMapOvr>
     <a:masterClrMapping/>
   </p:clrMapOvr>
+  <p:timing>
+    <p:tnLst>
+      <p:par>
+        <p:cTn id="1" dur="indefinite" restart="never" nodeType="tmRoot"/>
+      </p:par>
+    </p:tnLst>
+  </p:timing>
 </p:sld>
 </file>
 
@@ -12299,7 +12668,7 @@
           <p:cNvPr id="2" name="Title 1">
             <a:extLst>
               <a:ext uri="{FF2B5EF4-FFF2-40B4-BE49-F238E27FC236}">
-                <a16:creationId xmlns:a16="http://schemas.microsoft.com/office/drawing/2014/main" id="{F37F33D8-89FE-48B8-A752-27F23E51A526}"/>
+                <a16:creationId xmlns:a16="http://schemas.microsoft.com/office/drawing/2014/main" xmlns="" id="{F37F33D8-89FE-48B8-A752-27F23E51A526}"/>
               </a:ext>
             </a:extLst>
           </p:cNvPr>
@@ -12335,7 +12704,7 @@
           <p:cNvPr id="3" name="Content Placeholder 2">
             <a:extLst>
               <a:ext uri="{FF2B5EF4-FFF2-40B4-BE49-F238E27FC236}">
-                <a16:creationId xmlns:a16="http://schemas.microsoft.com/office/drawing/2014/main" id="{98F4B88D-129A-478A-BFFB-ECD1D1B08F11}"/>
+                <a16:creationId xmlns:a16="http://schemas.microsoft.com/office/drawing/2014/main" xmlns="" id="{98F4B88D-129A-478A-BFFB-ECD1D1B08F11}"/>
               </a:ext>
             </a:extLst>
           </p:cNvPr>
@@ -12421,10 +12790,10 @@
           <p:cNvPr id="10" name="Oval 9">
             <a:extLst>
               <a:ext uri="{FF2B5EF4-FFF2-40B4-BE49-F238E27FC236}">
-                <a16:creationId xmlns:a16="http://schemas.microsoft.com/office/drawing/2014/main" id="{A7B99495-F43F-4D80-A44F-2CB4764EB90B}"/>
+                <a16:creationId xmlns:a16="http://schemas.microsoft.com/office/drawing/2014/main" xmlns="" id="{A7B99495-F43F-4D80-A44F-2CB4764EB90B}"/>
               </a:ext>
               <a:ext uri="{C183D7F6-B498-43B3-948B-1728B52AA6E4}">
-                <adec:decorative xmlns:adec="http://schemas.microsoft.com/office/drawing/2017/decorative" val="1"/>
+                <adec:decorative xmlns:adec="http://schemas.microsoft.com/office/drawing/2017/decorative" xmlns="" val="1"/>
               </a:ext>
             </a:extLst>
           </p:cNvPr>
@@ -12434,7 +12803,7 @@
           <p:nvPr>
             <p:extLst>
               <p:ext uri="{386F3935-93C4-4BCD-93E2-E3B085C9AB24}">
-                <p16:designElem xmlns:p16="http://schemas.microsoft.com/office/powerpoint/2015/main" val="1"/>
+                <p16:designElem xmlns:p16="http://schemas.microsoft.com/office/powerpoint/2015/main" xmlns="" val="1"/>
               </p:ext>
             </p:extLst>
           </p:nvPr>
@@ -12513,10 +12882,10 @@
           <p:cNvPr id="12" name="Arc 11">
             <a:extLst>
               <a:ext uri="{FF2B5EF4-FFF2-40B4-BE49-F238E27FC236}">
-                <a16:creationId xmlns:a16="http://schemas.microsoft.com/office/drawing/2014/main" id="{72DEF309-605D-4117-9340-6D589B6C3A34}"/>
+                <a16:creationId xmlns:a16="http://schemas.microsoft.com/office/drawing/2014/main" xmlns="" id="{72DEF309-605D-4117-9340-6D589B6C3A34}"/>
               </a:ext>
               <a:ext uri="{C183D7F6-B498-43B3-948B-1728B52AA6E4}">
-                <adec:decorative xmlns:adec="http://schemas.microsoft.com/office/drawing/2017/decorative" val="1"/>
+                <adec:decorative xmlns:adec="http://schemas.microsoft.com/office/drawing/2017/decorative" xmlns="" val="1"/>
               </a:ext>
             </a:extLst>
           </p:cNvPr>
@@ -12526,7 +12895,7 @@
           <p:nvPr>
             <p:extLst>
               <p:ext uri="{386F3935-93C4-4BCD-93E2-E3B085C9AB24}">
-                <p16:designElem xmlns:p16="http://schemas.microsoft.com/office/powerpoint/2015/main" val="1"/>
+                <p16:designElem xmlns:p16="http://schemas.microsoft.com/office/powerpoint/2015/main" xmlns="" val="1"/>
               </p:ext>
             </p:extLst>
           </p:nvPr>
@@ -12577,7 +12946,7 @@
           <p:cNvPr id="7" name="Picture 6" descr="A picture containing refrigerator&#10;&#10;Description automatically generated">
             <a:extLst>
               <a:ext uri="{FF2B5EF4-FFF2-40B4-BE49-F238E27FC236}">
-                <a16:creationId xmlns:a16="http://schemas.microsoft.com/office/drawing/2014/main" id="{138656E3-2912-42EF-9C86-F8CD76DEBC1F}"/>
+                <a16:creationId xmlns:a16="http://schemas.microsoft.com/office/drawing/2014/main" xmlns="" id="{138656E3-2912-42EF-9C86-F8CD76DEBC1F}"/>
               </a:ext>
             </a:extLst>
           </p:cNvPr>
@@ -12618,6 +12987,13 @@
   <p:clrMapOvr>
     <a:masterClrMapping/>
   </p:clrMapOvr>
+  <p:timing>
+    <p:tnLst>
+      <p:par>
+        <p:cTn id="1" dur="indefinite" restart="never" nodeType="tmRoot"/>
+      </p:par>
+    </p:tnLst>
+  </p:timing>
 </p:sld>
 </file>
 

</xml_diff>